<commit_message>
added pdf and extra interpretability
</commit_message>
<xml_diff>
--- a/Slides/talk.pptx
+++ b/Slides/talk.pptx
@@ -5,10 +5,10 @@
     <p:sldMasterId id="2147483687" r:id="rId4"/>
   </p:sldMasterIdLst>
   <p:notesMasterIdLst>
-    <p:notesMasterId r:id="rId27"/>
+    <p:notesMasterId r:id="rId28"/>
   </p:notesMasterIdLst>
   <p:handoutMasterIdLst>
-    <p:handoutMasterId r:id="rId28"/>
+    <p:handoutMasterId r:id="rId29"/>
   </p:handoutMasterIdLst>
   <p:sldIdLst>
     <p:sldId id="1864" r:id="rId5"/>
@@ -28,11 +28,12 @@
     <p:sldId id="1900" r:id="rId19"/>
     <p:sldId id="1901" r:id="rId20"/>
     <p:sldId id="1889" r:id="rId21"/>
-    <p:sldId id="1903" r:id="rId22"/>
-    <p:sldId id="1905" r:id="rId23"/>
-    <p:sldId id="1868" r:id="rId24"/>
-    <p:sldId id="1890" r:id="rId25"/>
-    <p:sldId id="1883" r:id="rId26"/>
+    <p:sldId id="1907" r:id="rId22"/>
+    <p:sldId id="1903" r:id="rId23"/>
+    <p:sldId id="1905" r:id="rId24"/>
+    <p:sldId id="1868" r:id="rId25"/>
+    <p:sldId id="1908" r:id="rId26"/>
+    <p:sldId id="1883" r:id="rId27"/>
   </p:sldIdLst>
   <p:sldSz cx="12192000" cy="6858000"/>
   <p:notesSz cx="6858000" cy="9144000"/>
@@ -183,10 +184,11 @@
             <p14:sldId id="1900"/>
             <p14:sldId id="1901"/>
             <p14:sldId id="1889"/>
+            <p14:sldId id="1907"/>
             <p14:sldId id="1903"/>
             <p14:sldId id="1905"/>
             <p14:sldId id="1868"/>
-            <p14:sldId id="1890"/>
+            <p14:sldId id="1908"/>
             <p14:sldId id="1883"/>
           </p14:sldIdLst>
         </p14:section>
@@ -307,7 +309,7 @@
           <a:p>
             <a:fld id="{30CD4961-0791-4140-A452-41CFA6EC0553}" type="datetimeFigureOut">
               <a:rPr lang="en-US" smtClean="0"/>
-              <a:t>6/12/22</a:t>
+              <a:t>6/13/22</a:t>
             </a:fld>
             <a:endParaRPr lang="en-US" dirty="0"/>
           </a:p>
@@ -2613,7 +2615,7 @@
           <a:p>
             <a:fld id="{50A1B9BC-7BE7-4893-90FD-CC95830FD8F2}" type="datetimeFigureOut">
               <a:rPr lang="en-US" smtClean="0"/>
-              <a:t>6/12/22</a:t>
+              <a:t>6/13/22</a:t>
             </a:fld>
             <a:endParaRPr lang="en-US" dirty="0"/>
           </a:p>
@@ -3909,6 +3911,84 @@
   <p:clrMapOvr>
     <a:masterClrMapping/>
   </p:clrMapOvr>
+  <p:timing>
+    <p:tnLst>
+      <p:par>
+        <p:cTn id="1" dur="indefinite" restart="never" nodeType="tmRoot">
+          <p:childTnLst>
+            <p:seq concurrent="1" nextAc="seek">
+              <p:cTn id="2" dur="indefinite" nodeType="mainSeq">
+                <p:childTnLst>
+                  <p:par>
+                    <p:cTn id="3" fill="hold">
+                      <p:stCondLst>
+                        <p:cond delay="indefinite"/>
+                      </p:stCondLst>
+                      <p:childTnLst>
+                        <p:par>
+                          <p:cTn id="4" fill="hold">
+                            <p:stCondLst>
+                              <p:cond delay="0"/>
+                            </p:stCondLst>
+                            <p:childTnLst>
+                              <p:par>
+                                <p:cTn id="5" presetID="1" presetClass="entr" presetSubtype="0" fill="hold" grpId="0" nodeType="clickEffect">
+                                  <p:stCondLst>
+                                    <p:cond delay="0"/>
+                                  </p:stCondLst>
+                                  <p:childTnLst>
+                                    <p:set>
+                                      <p:cBhvr>
+                                        <p:cTn id="6" dur="1" fill="hold">
+                                          <p:stCondLst>
+                                            <p:cond delay="0"/>
+                                          </p:stCondLst>
+                                        </p:cTn>
+                                        <p:tgtEl>
+                                          <p:spTgt spid="8"/>
+                                        </p:tgtEl>
+                                        <p:attrNameLst>
+                                          <p:attrName>style.visibility</p:attrName>
+                                        </p:attrNameLst>
+                                      </p:cBhvr>
+                                      <p:to>
+                                        <p:strVal val="visible"/>
+                                      </p:to>
+                                    </p:set>
+                                  </p:childTnLst>
+                                </p:cTn>
+                              </p:par>
+                            </p:childTnLst>
+                          </p:cTn>
+                        </p:par>
+                      </p:childTnLst>
+                    </p:cTn>
+                  </p:par>
+                </p:childTnLst>
+              </p:cTn>
+              <p:prevCondLst>
+                <p:cond evt="onPrev" delay="0">
+                  <p:tgtEl>
+                    <p:sldTgt/>
+                  </p:tgtEl>
+                </p:cond>
+              </p:prevCondLst>
+              <p:nextCondLst>
+                <p:cond evt="onNext" delay="0">
+                  <p:tgtEl>
+                    <p:sldTgt/>
+                  </p:tgtEl>
+                </p:cond>
+              </p:nextCondLst>
+            </p:seq>
+          </p:childTnLst>
+        </p:cTn>
+      </p:par>
+    </p:tnLst>
+    <p:bldLst>
+      <p:bldP spid="8" grpId="0"/>
+    </p:bldLst>
+  </p:timing>
 </p:sld>
 </file>
 
@@ -4086,8 +4166,8 @@
         </p:nvSpPr>
         <p:spPr>
           <a:xfrm>
-            <a:off x="6271433" y="1911349"/>
-            <a:ext cx="5775001" cy="4230690"/>
+            <a:off x="6271433" y="1911348"/>
+            <a:ext cx="5775001" cy="4464047"/>
           </a:xfrm>
         </p:spPr>
         <p:txBody>
@@ -4096,6 +4176,40 @@
           </a:bodyPr>
           <a:lstStyle/>
           <a:p>
+            <a:r>
+              <a:rPr lang="en-NL" dirty="0">
+                <a:solidFill>
+                  <a:schemeClr val="tx1"/>
+                </a:solidFill>
+              </a:rPr>
+              <a:t>Hyperparameter tuning using cross-validation</a:t>
+            </a:r>
+            <a:r>
+              <a:rPr lang="en-NL" b="0" dirty="0">
+                <a:solidFill>
+                  <a:schemeClr val="tx1"/>
+                </a:solidFill>
+              </a:rPr>
+              <a:t> </a:t>
+            </a:r>
+            <a:r>
+              <a:rPr lang="en-NL" b="0" dirty="0">
+                <a:solidFill>
+                  <a:schemeClr val="tx1"/>
+                </a:solidFill>
+                <a:sym typeface="Wingdings" pitchFamily="2" charset="2"/>
+              </a:rPr>
+              <a:t></a:t>
+            </a:r>
+            <a:r>
+              <a:rPr lang="en-NL" dirty="0">
+                <a:solidFill>
+                  <a:schemeClr val="tx1"/>
+                </a:solidFill>
+                <a:sym typeface="Wingdings" pitchFamily="2" charset="2"/>
+              </a:rPr>
+              <a:t> </a:t>
+            </a:r>
             <a:r>
               <a:rPr lang="en-NL" b="0" dirty="0">
                 <a:solidFill>
@@ -4230,14 +4344,11 @@
           </a:p>
           <a:p>
             <a:pPr marL="285750" indent="-285750"/>
-            <a:r>
-              <a:rPr lang="en-NL" dirty="0">
-                <a:solidFill>
-                  <a:schemeClr val="tx1"/>
-                </a:solidFill>
-              </a:rPr>
-              <a:t>In practice: Hyperparameter tuning using crossvalidation</a:t>
-            </a:r>
+            <a:endParaRPr lang="en-NL" dirty="0">
+              <a:solidFill>
+                <a:schemeClr val="tx1"/>
+              </a:solidFill>
+            </a:endParaRPr>
           </a:p>
         </p:txBody>
       </p:sp>
@@ -4514,6 +4625,529 @@
   <p:clrMapOvr>
     <a:masterClrMapping/>
   </p:clrMapOvr>
+  <p:timing>
+    <p:tnLst>
+      <p:par>
+        <p:cTn id="1" dur="indefinite" restart="never" nodeType="tmRoot">
+          <p:childTnLst>
+            <p:seq concurrent="1" nextAc="seek">
+              <p:cTn id="2" dur="indefinite" nodeType="mainSeq">
+                <p:childTnLst>
+                  <p:par>
+                    <p:cTn id="3" fill="hold">
+                      <p:stCondLst>
+                        <p:cond delay="indefinite"/>
+                      </p:stCondLst>
+                      <p:childTnLst>
+                        <p:par>
+                          <p:cTn id="4" fill="hold">
+                            <p:stCondLst>
+                              <p:cond delay="0"/>
+                            </p:stCondLst>
+                            <p:childTnLst>
+                              <p:par>
+                                <p:cTn id="5" presetID="1" presetClass="entr" presetSubtype="0" fill="hold" nodeType="clickEffect">
+                                  <p:stCondLst>
+                                    <p:cond delay="0"/>
+                                  </p:stCondLst>
+                                  <p:childTnLst>
+                                    <p:set>
+                                      <p:cBhvr>
+                                        <p:cTn id="6" dur="1" fill="hold">
+                                          <p:stCondLst>
+                                            <p:cond delay="0"/>
+                                          </p:stCondLst>
+                                        </p:cTn>
+                                        <p:tgtEl>
+                                          <p:spTgt spid="17"/>
+                                        </p:tgtEl>
+                                        <p:attrNameLst>
+                                          <p:attrName>style.visibility</p:attrName>
+                                        </p:attrNameLst>
+                                      </p:cBhvr>
+                                      <p:to>
+                                        <p:strVal val="visible"/>
+                                      </p:to>
+                                    </p:set>
+                                  </p:childTnLst>
+                                </p:cTn>
+                              </p:par>
+                            </p:childTnLst>
+                          </p:cTn>
+                        </p:par>
+                      </p:childTnLst>
+                    </p:cTn>
+                  </p:par>
+                  <p:par>
+                    <p:cTn id="7" fill="hold">
+                      <p:stCondLst>
+                        <p:cond delay="indefinite"/>
+                      </p:stCondLst>
+                      <p:childTnLst>
+                        <p:par>
+                          <p:cTn id="8" fill="hold">
+                            <p:stCondLst>
+                              <p:cond delay="0"/>
+                            </p:stCondLst>
+                            <p:childTnLst>
+                              <p:par>
+                                <p:cTn id="9" presetID="1" presetClass="entr" presetSubtype="0" fill="hold" nodeType="clickEffect">
+                                  <p:stCondLst>
+                                    <p:cond delay="0"/>
+                                  </p:stCondLst>
+                                  <p:childTnLst>
+                                    <p:set>
+                                      <p:cBhvr>
+                                        <p:cTn id="10" dur="1" fill="hold">
+                                          <p:stCondLst>
+                                            <p:cond delay="0"/>
+                                          </p:stCondLst>
+                                        </p:cTn>
+                                        <p:tgtEl>
+                                          <p:spTgt spid="18"/>
+                                        </p:tgtEl>
+                                        <p:attrNameLst>
+                                          <p:attrName>style.visibility</p:attrName>
+                                        </p:attrNameLst>
+                                      </p:cBhvr>
+                                      <p:to>
+                                        <p:strVal val="visible"/>
+                                      </p:to>
+                                    </p:set>
+                                  </p:childTnLst>
+                                </p:cTn>
+                              </p:par>
+                            </p:childTnLst>
+                          </p:cTn>
+                        </p:par>
+                      </p:childTnLst>
+                    </p:cTn>
+                  </p:par>
+                  <p:par>
+                    <p:cTn id="11" fill="hold">
+                      <p:stCondLst>
+                        <p:cond delay="indefinite"/>
+                      </p:stCondLst>
+                      <p:childTnLst>
+                        <p:par>
+                          <p:cTn id="12" fill="hold">
+                            <p:stCondLst>
+                              <p:cond delay="0"/>
+                            </p:stCondLst>
+                            <p:childTnLst>
+                              <p:par>
+                                <p:cTn id="13" presetID="1" presetClass="entr" presetSubtype="0" fill="hold" grpId="0" nodeType="clickEffect">
+                                  <p:stCondLst>
+                                    <p:cond delay="0"/>
+                                  </p:stCondLst>
+                                  <p:childTnLst>
+                                    <p:set>
+                                      <p:cBhvr>
+                                        <p:cTn id="14" dur="1" fill="hold">
+                                          <p:stCondLst>
+                                            <p:cond delay="0"/>
+                                          </p:stCondLst>
+                                        </p:cTn>
+                                        <p:tgtEl>
+                                          <p:spTgt spid="2">
+                                            <p:txEl>
+                                              <p:pRg st="0" end="0"/>
+                                            </p:txEl>
+                                          </p:spTgt>
+                                        </p:tgtEl>
+                                        <p:attrNameLst>
+                                          <p:attrName>style.visibility</p:attrName>
+                                        </p:attrNameLst>
+                                      </p:cBhvr>
+                                      <p:to>
+                                        <p:strVal val="visible"/>
+                                      </p:to>
+                                    </p:set>
+                                  </p:childTnLst>
+                                </p:cTn>
+                              </p:par>
+                            </p:childTnLst>
+                          </p:cTn>
+                        </p:par>
+                      </p:childTnLst>
+                    </p:cTn>
+                  </p:par>
+                  <p:par>
+                    <p:cTn id="15" fill="hold">
+                      <p:stCondLst>
+                        <p:cond delay="indefinite"/>
+                      </p:stCondLst>
+                      <p:childTnLst>
+                        <p:par>
+                          <p:cTn id="16" fill="hold">
+                            <p:stCondLst>
+                              <p:cond delay="0"/>
+                            </p:stCondLst>
+                            <p:childTnLst>
+                              <p:par>
+                                <p:cTn id="17" presetID="1" presetClass="entr" presetSubtype="0" fill="hold" grpId="0" nodeType="clickEffect">
+                                  <p:stCondLst>
+                                    <p:cond delay="0"/>
+                                  </p:stCondLst>
+                                  <p:childTnLst>
+                                    <p:set>
+                                      <p:cBhvr>
+                                        <p:cTn id="18" dur="1" fill="hold">
+                                          <p:stCondLst>
+                                            <p:cond delay="0"/>
+                                          </p:stCondLst>
+                                        </p:cTn>
+                                        <p:tgtEl>
+                                          <p:spTgt spid="2">
+                                            <p:txEl>
+                                              <p:pRg st="1" end="1"/>
+                                            </p:txEl>
+                                          </p:spTgt>
+                                        </p:tgtEl>
+                                        <p:attrNameLst>
+                                          <p:attrName>style.visibility</p:attrName>
+                                        </p:attrNameLst>
+                                      </p:cBhvr>
+                                      <p:to>
+                                        <p:strVal val="visible"/>
+                                      </p:to>
+                                    </p:set>
+                                  </p:childTnLst>
+                                </p:cTn>
+                              </p:par>
+                            </p:childTnLst>
+                          </p:cTn>
+                        </p:par>
+                      </p:childTnLst>
+                    </p:cTn>
+                  </p:par>
+                  <p:par>
+                    <p:cTn id="19" fill="hold">
+                      <p:stCondLst>
+                        <p:cond delay="indefinite"/>
+                      </p:stCondLst>
+                      <p:childTnLst>
+                        <p:par>
+                          <p:cTn id="20" fill="hold">
+                            <p:stCondLst>
+                              <p:cond delay="0"/>
+                            </p:stCondLst>
+                            <p:childTnLst>
+                              <p:par>
+                                <p:cTn id="21" presetID="1" presetClass="entr" presetSubtype="0" fill="hold" grpId="0" nodeType="clickEffect">
+                                  <p:stCondLst>
+                                    <p:cond delay="0"/>
+                                  </p:stCondLst>
+                                  <p:childTnLst>
+                                    <p:set>
+                                      <p:cBhvr>
+                                        <p:cTn id="22" dur="1" fill="hold">
+                                          <p:stCondLst>
+                                            <p:cond delay="0"/>
+                                          </p:stCondLst>
+                                        </p:cTn>
+                                        <p:tgtEl>
+                                          <p:spTgt spid="2">
+                                            <p:txEl>
+                                              <p:pRg st="2" end="2"/>
+                                            </p:txEl>
+                                          </p:spTgt>
+                                        </p:tgtEl>
+                                        <p:attrNameLst>
+                                          <p:attrName>style.visibility</p:attrName>
+                                        </p:attrNameLst>
+                                      </p:cBhvr>
+                                      <p:to>
+                                        <p:strVal val="visible"/>
+                                      </p:to>
+                                    </p:set>
+                                  </p:childTnLst>
+                                </p:cTn>
+                              </p:par>
+                              <p:par>
+                                <p:cTn id="23" presetID="1" presetClass="entr" presetSubtype="0" fill="hold" grpId="0" nodeType="withEffect">
+                                  <p:stCondLst>
+                                    <p:cond delay="0"/>
+                                  </p:stCondLst>
+                                  <p:childTnLst>
+                                    <p:set>
+                                      <p:cBhvr>
+                                        <p:cTn id="24" dur="1" fill="hold">
+                                          <p:stCondLst>
+                                            <p:cond delay="0"/>
+                                          </p:stCondLst>
+                                        </p:cTn>
+                                        <p:tgtEl>
+                                          <p:spTgt spid="2">
+                                            <p:txEl>
+                                              <p:pRg st="3" end="3"/>
+                                            </p:txEl>
+                                          </p:spTgt>
+                                        </p:tgtEl>
+                                        <p:attrNameLst>
+                                          <p:attrName>style.visibility</p:attrName>
+                                        </p:attrNameLst>
+                                      </p:cBhvr>
+                                      <p:to>
+                                        <p:strVal val="visible"/>
+                                      </p:to>
+                                    </p:set>
+                                  </p:childTnLst>
+                                </p:cTn>
+                              </p:par>
+                              <p:par>
+                                <p:cTn id="25" presetID="1" presetClass="entr" presetSubtype="0" fill="hold" grpId="0" nodeType="withEffect">
+                                  <p:stCondLst>
+                                    <p:cond delay="0"/>
+                                  </p:stCondLst>
+                                  <p:childTnLst>
+                                    <p:set>
+                                      <p:cBhvr>
+                                        <p:cTn id="26" dur="1" fill="hold">
+                                          <p:stCondLst>
+                                            <p:cond delay="0"/>
+                                          </p:stCondLst>
+                                        </p:cTn>
+                                        <p:tgtEl>
+                                          <p:spTgt spid="2">
+                                            <p:txEl>
+                                              <p:pRg st="4" end="4"/>
+                                            </p:txEl>
+                                          </p:spTgt>
+                                        </p:tgtEl>
+                                        <p:attrNameLst>
+                                          <p:attrName>style.visibility</p:attrName>
+                                        </p:attrNameLst>
+                                      </p:cBhvr>
+                                      <p:to>
+                                        <p:strVal val="visible"/>
+                                      </p:to>
+                                    </p:set>
+                                  </p:childTnLst>
+                                </p:cTn>
+                              </p:par>
+                              <p:par>
+                                <p:cTn id="27" presetID="1" presetClass="entr" presetSubtype="0" fill="hold" grpId="0" nodeType="withEffect">
+                                  <p:stCondLst>
+                                    <p:cond delay="0"/>
+                                  </p:stCondLst>
+                                  <p:childTnLst>
+                                    <p:set>
+                                      <p:cBhvr>
+                                        <p:cTn id="28" dur="1" fill="hold">
+                                          <p:stCondLst>
+                                            <p:cond delay="0"/>
+                                          </p:stCondLst>
+                                        </p:cTn>
+                                        <p:tgtEl>
+                                          <p:spTgt spid="2">
+                                            <p:txEl>
+                                              <p:pRg st="5" end="5"/>
+                                            </p:txEl>
+                                          </p:spTgt>
+                                        </p:tgtEl>
+                                        <p:attrNameLst>
+                                          <p:attrName>style.visibility</p:attrName>
+                                        </p:attrNameLst>
+                                      </p:cBhvr>
+                                      <p:to>
+                                        <p:strVal val="visible"/>
+                                      </p:to>
+                                    </p:set>
+                                  </p:childTnLst>
+                                </p:cTn>
+                              </p:par>
+                              <p:par>
+                                <p:cTn id="29" presetID="1" presetClass="entr" presetSubtype="0" fill="hold" grpId="0" nodeType="withEffect">
+                                  <p:stCondLst>
+                                    <p:cond delay="0"/>
+                                  </p:stCondLst>
+                                  <p:childTnLst>
+                                    <p:set>
+                                      <p:cBhvr>
+                                        <p:cTn id="30" dur="1" fill="hold">
+                                          <p:stCondLst>
+                                            <p:cond delay="0"/>
+                                          </p:stCondLst>
+                                        </p:cTn>
+                                        <p:tgtEl>
+                                          <p:spTgt spid="2">
+                                            <p:txEl>
+                                              <p:pRg st="6" end="6"/>
+                                            </p:txEl>
+                                          </p:spTgt>
+                                        </p:tgtEl>
+                                        <p:attrNameLst>
+                                          <p:attrName>style.visibility</p:attrName>
+                                        </p:attrNameLst>
+                                      </p:cBhvr>
+                                      <p:to>
+                                        <p:strVal val="visible"/>
+                                      </p:to>
+                                    </p:set>
+                                  </p:childTnLst>
+                                </p:cTn>
+                              </p:par>
+                            </p:childTnLst>
+                          </p:cTn>
+                        </p:par>
+                      </p:childTnLst>
+                    </p:cTn>
+                  </p:par>
+                  <p:par>
+                    <p:cTn id="31" fill="hold">
+                      <p:stCondLst>
+                        <p:cond delay="indefinite"/>
+                      </p:stCondLst>
+                      <p:childTnLst>
+                        <p:par>
+                          <p:cTn id="32" fill="hold">
+                            <p:stCondLst>
+                              <p:cond delay="0"/>
+                            </p:stCondLst>
+                            <p:childTnLst>
+                              <p:par>
+                                <p:cTn id="33" presetID="1" presetClass="entr" presetSubtype="0" fill="hold" grpId="0" nodeType="clickEffect">
+                                  <p:stCondLst>
+                                    <p:cond delay="0"/>
+                                  </p:stCondLst>
+                                  <p:childTnLst>
+                                    <p:set>
+                                      <p:cBhvr>
+                                        <p:cTn id="34" dur="1" fill="hold">
+                                          <p:stCondLst>
+                                            <p:cond delay="0"/>
+                                          </p:stCondLst>
+                                        </p:cTn>
+                                        <p:tgtEl>
+                                          <p:spTgt spid="2">
+                                            <p:txEl>
+                                              <p:pRg st="7" end="7"/>
+                                            </p:txEl>
+                                          </p:spTgt>
+                                        </p:tgtEl>
+                                        <p:attrNameLst>
+                                          <p:attrName>style.visibility</p:attrName>
+                                        </p:attrNameLst>
+                                      </p:cBhvr>
+                                      <p:to>
+                                        <p:strVal val="visible"/>
+                                      </p:to>
+                                    </p:set>
+                                  </p:childTnLst>
+                                </p:cTn>
+                              </p:par>
+                              <p:par>
+                                <p:cTn id="35" presetID="1" presetClass="entr" presetSubtype="0" fill="hold" grpId="0" nodeType="withEffect">
+                                  <p:stCondLst>
+                                    <p:cond delay="0"/>
+                                  </p:stCondLst>
+                                  <p:childTnLst>
+                                    <p:set>
+                                      <p:cBhvr>
+                                        <p:cTn id="36" dur="1" fill="hold">
+                                          <p:stCondLst>
+                                            <p:cond delay="0"/>
+                                          </p:stCondLst>
+                                        </p:cTn>
+                                        <p:tgtEl>
+                                          <p:spTgt spid="2">
+                                            <p:txEl>
+                                              <p:pRg st="8" end="8"/>
+                                            </p:txEl>
+                                          </p:spTgt>
+                                        </p:tgtEl>
+                                        <p:attrNameLst>
+                                          <p:attrName>style.visibility</p:attrName>
+                                        </p:attrNameLst>
+                                      </p:cBhvr>
+                                      <p:to>
+                                        <p:strVal val="visible"/>
+                                      </p:to>
+                                    </p:set>
+                                  </p:childTnLst>
+                                </p:cTn>
+                              </p:par>
+                            </p:childTnLst>
+                          </p:cTn>
+                        </p:par>
+                      </p:childTnLst>
+                    </p:cTn>
+                  </p:par>
+                  <p:par>
+                    <p:cTn id="37" fill="hold">
+                      <p:stCondLst>
+                        <p:cond delay="indefinite"/>
+                      </p:stCondLst>
+                      <p:childTnLst>
+                        <p:par>
+                          <p:cTn id="38" fill="hold">
+                            <p:stCondLst>
+                              <p:cond delay="0"/>
+                            </p:stCondLst>
+                            <p:childTnLst>
+                              <p:par>
+                                <p:cTn id="39" presetID="1" presetClass="entr" presetSubtype="0" fill="hold" grpId="0" nodeType="clickEffect">
+                                  <p:stCondLst>
+                                    <p:cond delay="0"/>
+                                  </p:stCondLst>
+                                  <p:childTnLst>
+                                    <p:set>
+                                      <p:cBhvr>
+                                        <p:cTn id="40" dur="1" fill="hold">
+                                          <p:stCondLst>
+                                            <p:cond delay="0"/>
+                                          </p:stCondLst>
+                                        </p:cTn>
+                                        <p:tgtEl>
+                                          <p:spTgt spid="2">
+                                            <p:txEl>
+                                              <p:pRg st="9" end="9"/>
+                                            </p:txEl>
+                                          </p:spTgt>
+                                        </p:tgtEl>
+                                        <p:attrNameLst>
+                                          <p:attrName>style.visibility</p:attrName>
+                                        </p:attrNameLst>
+                                      </p:cBhvr>
+                                      <p:to>
+                                        <p:strVal val="visible"/>
+                                      </p:to>
+                                    </p:set>
+                                  </p:childTnLst>
+                                </p:cTn>
+                              </p:par>
+                            </p:childTnLst>
+                          </p:cTn>
+                        </p:par>
+                      </p:childTnLst>
+                    </p:cTn>
+                  </p:par>
+                </p:childTnLst>
+              </p:cTn>
+              <p:prevCondLst>
+                <p:cond evt="onPrev" delay="0">
+                  <p:tgtEl>
+                    <p:sldTgt/>
+                  </p:tgtEl>
+                </p:cond>
+              </p:prevCondLst>
+              <p:nextCondLst>
+                <p:cond evt="onNext" delay="0">
+                  <p:tgtEl>
+                    <p:sldTgt/>
+                  </p:tgtEl>
+                </p:cond>
+              </p:nextCondLst>
+            </p:seq>
+          </p:childTnLst>
+        </p:cTn>
+      </p:par>
+    </p:tnLst>
+    <p:bldLst>
+      <p:bldP spid="2" grpId="0" build="p"/>
+    </p:bldLst>
+  </p:timing>
 </p:sld>
 </file>
 
@@ -5185,7 +5819,7 @@
         <p:spPr>
           <a:xfrm>
             <a:off x="762000" y="1574800"/>
-            <a:ext cx="11036300" cy="4273550"/>
+            <a:ext cx="11036300" cy="1854200"/>
           </a:xfrm>
         </p:spPr>
         <p:txBody>
@@ -5200,7 +5834,7 @@
             </a:r>
             <a:r>
               <a:rPr lang="en-NL" b="0" dirty="0"/>
-              <a:t>: Inform the human the reason of the prediction</a:t>
+              <a:t>: Inform the human about the factors determining the prediction</a:t>
             </a:r>
           </a:p>
           <a:p>
@@ -5224,16 +5858,6 @@
           </a:p>
           <a:p>
             <a:endParaRPr lang="en-US" b="0" dirty="0"/>
-          </a:p>
-          <a:p>
-            <a:r>
-              <a:rPr lang="en-US" b="0" dirty="0"/>
-              <a:t>Two examples of women diagnosed with cervical cancer (</a:t>
-            </a:r>
-            <a:r>
-              <a:rPr lang="en-GB" b="0" dirty="0"/>
-              <a:t>Interpretable Machine Learning, C. Molnar 2022) </a:t>
-            </a:r>
           </a:p>
           <a:p>
             <a:endParaRPr lang="en-US" b="0" dirty="0"/>
@@ -5303,8 +5927,8 @@
         </p:blipFill>
         <p:spPr bwMode="auto">
           <a:xfrm>
-            <a:off x="762000" y="3981450"/>
-            <a:ext cx="6758379" cy="1270000"/>
+            <a:off x="762000" y="3263900"/>
+            <a:ext cx="8102600" cy="1522599"/>
           </a:xfrm>
           <a:prstGeom prst="rect">
             <a:avLst/>
@@ -5348,8 +5972,8 @@
         </p:blipFill>
         <p:spPr bwMode="auto">
           <a:xfrm>
-            <a:off x="762000" y="5365750"/>
-            <a:ext cx="6758379" cy="1270000"/>
+            <a:off x="762000" y="4953000"/>
+            <a:ext cx="8102600" cy="1522599"/>
           </a:xfrm>
           <a:prstGeom prst="rect">
             <a:avLst/>
@@ -5366,6 +5990,57 @@
           </a:extLst>
         </p:spPr>
       </p:pic>
+      <p:sp>
+        <p:nvSpPr>
+          <p:cNvPr id="8" name="TextBox 7">
+            <a:extLst>
+              <a:ext uri="{FF2B5EF4-FFF2-40B4-BE49-F238E27FC236}">
+                <a16:creationId xmlns:a16="http://schemas.microsoft.com/office/drawing/2014/main" id="{5CF51136-DB39-3E31-771A-0714CC3F5880}"/>
+              </a:ext>
+            </a:extLst>
+          </p:cNvPr>
+          <p:cNvSpPr txBox="1"/>
+          <p:nvPr/>
+        </p:nvSpPr>
+        <p:spPr>
+          <a:xfrm>
+            <a:off x="8864600" y="5772707"/>
+            <a:ext cx="3048000" cy="738664"/>
+          </a:xfrm>
+          <a:prstGeom prst="rect">
+            <a:avLst/>
+          </a:prstGeom>
+          <a:noFill/>
+        </p:spPr>
+        <p:txBody>
+          <a:bodyPr wrap="square">
+            <a:spAutoFit/>
+          </a:bodyPr>
+          <a:lstStyle/>
+          <a:p>
+            <a:r>
+              <a:rPr lang="en-US" sz="1400" b="0" dirty="0">
+                <a:solidFill>
+                  <a:schemeClr val="bg1">
+                    <a:lumMod val="50000"/>
+                  </a:schemeClr>
+                </a:solidFill>
+              </a:rPr>
+              <a:t>Two examples of women diagnosed with cervical cancer (</a:t>
+            </a:r>
+            <a:r>
+              <a:rPr lang="en-GB" sz="1400" b="0" dirty="0">
+                <a:solidFill>
+                  <a:schemeClr val="bg1">
+                    <a:lumMod val="50000"/>
+                  </a:schemeClr>
+                </a:solidFill>
+              </a:rPr>
+              <a:t>Interpretable Machine Learning, C. Molnar 2022) </a:t>
+            </a:r>
+          </a:p>
+        </p:txBody>
+      </p:sp>
     </p:spTree>
     <p:extLst>
       <p:ext uri="{BB962C8B-B14F-4D97-AF65-F5344CB8AC3E}">
@@ -5414,8 +6089,8 @@
         </p:nvSpPr>
         <p:spPr>
           <a:xfrm>
-            <a:off x="762000" y="1676400"/>
-            <a:ext cx="7302500" cy="4171950"/>
+            <a:off x="762000" y="1574800"/>
+            <a:ext cx="11036300" cy="4273550"/>
           </a:xfrm>
         </p:spPr>
         <p:txBody>
@@ -5425,21 +6100,24 @@
           <a:lstStyle/>
           <a:p>
             <a:r>
+              <a:rPr lang="en-NL" dirty="0"/>
+              <a:t>Goal</a:t>
+            </a:r>
+            <a:r>
               <a:rPr lang="en-NL" b="0" dirty="0"/>
-              <a:t>Goal: What are the main features</a:t>
-            </a:r>
-          </a:p>
-          <a:p>
+              <a:t>: Inform the human the reason of the prediction</a:t>
+            </a:r>
+            <a:endParaRPr lang="en-US" b="0" dirty="0"/>
+          </a:p>
+          <a:p>
+            <a:r>
+              <a:rPr lang="en-NL" dirty="0"/>
+              <a:t>Basic idea</a:t>
+            </a:r>
             <a:r>
               <a:rPr lang="en-NL" b="0" dirty="0"/>
-              <a:t>Basic idea: Average individual predictions</a:t>
-            </a:r>
-          </a:p>
-          <a:p>
-            <a:endParaRPr lang="en-US" b="0" dirty="0"/>
-          </a:p>
-          <a:p>
-            <a:endParaRPr lang="en-US" b="0" dirty="0"/>
+              <a:t>: Change the observations slightly to observe how the prediction will change</a:t>
+            </a:r>
           </a:p>
           <a:p>
             <a:endParaRPr lang="en-US" b="0" dirty="0"/>
@@ -5471,7 +6149,7 @@
         <p:spPr>
           <a:xfrm>
             <a:off x="762000" y="715961"/>
-            <a:ext cx="10083800" cy="1189038"/>
+            <a:ext cx="10083800" cy="706439"/>
           </a:xfrm>
         </p:spPr>
         <p:txBody>
@@ -5480,27 +6158,17 @@
           <a:p>
             <a:r>
               <a:rPr lang="en-NL" dirty="0"/>
-              <a:t>2: Local </a:t>
-            </a:r>
-            <a:r>
-              <a:rPr lang="en-NL" dirty="0">
-                <a:sym typeface="Wingdings" pitchFamily="2" charset="2"/>
-              </a:rPr>
-              <a:t> Global </a:t>
-            </a:r>
-            <a:r>
-              <a:rPr lang="en-NL" dirty="0"/>
-              <a:t>interpretability</a:t>
+              <a:t>2: Local interpretability</a:t>
             </a:r>
           </a:p>
         </p:txBody>
       </p:sp>
       <p:pic>
         <p:nvPicPr>
-          <p:cNvPr id="12290" name="Picture 2">
-            <a:extLst>
-              <a:ext uri="{FF2B5EF4-FFF2-40B4-BE49-F238E27FC236}">
-                <a16:creationId xmlns:a16="http://schemas.microsoft.com/office/drawing/2014/main" id="{F46E4790-F34F-2B74-F478-4C6B599AEC69}"/>
+          <p:cNvPr id="1026" name="Picture 2">
+            <a:extLst>
+              <a:ext uri="{FF2B5EF4-FFF2-40B4-BE49-F238E27FC236}">
+                <a16:creationId xmlns:a16="http://schemas.microsoft.com/office/drawing/2014/main" id="{EA25C71E-821F-F890-9DE4-5878078504DE}"/>
               </a:ext>
             </a:extLst>
           </p:cNvPr>
@@ -5524,8 +6192,8 @@
         </p:blipFill>
         <p:spPr bwMode="auto">
           <a:xfrm>
-            <a:off x="661355" y="2662238"/>
-            <a:ext cx="5142545" cy="3673246"/>
+            <a:off x="6064741" y="4851005"/>
+            <a:ext cx="4009571" cy="1489269"/>
           </a:xfrm>
           <a:prstGeom prst="rect">
             <a:avLst/>
@@ -5542,12 +6210,110 @@
           </a:extLst>
         </p:spPr>
       </p:pic>
+      <p:sp>
+        <p:nvSpPr>
+          <p:cNvPr id="12" name="TextBox 11">
+            <a:extLst>
+              <a:ext uri="{FF2B5EF4-FFF2-40B4-BE49-F238E27FC236}">
+                <a16:creationId xmlns:a16="http://schemas.microsoft.com/office/drawing/2014/main" id="{959E5450-84BE-04A8-2487-85C48715824F}"/>
+              </a:ext>
+            </a:extLst>
+          </p:cNvPr>
+          <p:cNvSpPr txBox="1"/>
+          <p:nvPr/>
+        </p:nvSpPr>
+        <p:spPr>
+          <a:xfrm>
+            <a:off x="6064741" y="6364294"/>
+            <a:ext cx="5139872" cy="461665"/>
+          </a:xfrm>
+          <a:prstGeom prst="rect">
+            <a:avLst/>
+          </a:prstGeom>
+          <a:noFill/>
+        </p:spPr>
+        <p:txBody>
+          <a:bodyPr wrap="square" rtlCol="0">
+            <a:spAutoFit/>
+          </a:bodyPr>
+          <a:lstStyle/>
+          <a:p>
+            <a:r>
+              <a:rPr lang="en-GB" sz="1200" dirty="0">
+                <a:solidFill>
+                  <a:schemeClr val="bg1">
+                    <a:lumMod val="50000"/>
+                  </a:schemeClr>
+                </a:solidFill>
+              </a:rPr>
+              <a:t>https://</a:t>
+            </a:r>
+            <a:r>
+              <a:rPr lang="en-GB" sz="1200" dirty="0" err="1">
+                <a:solidFill>
+                  <a:schemeClr val="bg1">
+                    <a:lumMod val="50000"/>
+                  </a:schemeClr>
+                </a:solidFill>
+              </a:rPr>
+              <a:t>silverpond.com.au</a:t>
+            </a:r>
+            <a:r>
+              <a:rPr lang="en-GB" sz="1200" dirty="0">
+                <a:solidFill>
+                  <a:schemeClr val="bg1">
+                    <a:lumMod val="50000"/>
+                  </a:schemeClr>
+                </a:solidFill>
+              </a:rPr>
+              <a:t>/2018/04/17/an-ai-tells-us-what-it-knows-when-we-poke-it-in-the-eye/</a:t>
+            </a:r>
+            <a:endParaRPr lang="en-NL" sz="1200" dirty="0">
+              <a:solidFill>
+                <a:schemeClr val="bg1">
+                  <a:lumMod val="50000"/>
+                </a:schemeClr>
+              </a:solidFill>
+            </a:endParaRPr>
+          </a:p>
+        </p:txBody>
+      </p:sp>
       <p:pic>
         <p:nvPicPr>
-          <p:cNvPr id="8" name="Picture 2" descr="PDPs for the bicycle count prediction model and temperature, humidity and wind speed. The largest differences can be seen in the temperature. The hotter, the more bikes are rented. This trend goes up to 20 degrees Celsius, then flattens and drops slightly at 30. Marks on the x-axis indicate the data distribution.">
-            <a:extLst>
-              <a:ext uri="{FF2B5EF4-FFF2-40B4-BE49-F238E27FC236}">
-                <a16:creationId xmlns:a16="http://schemas.microsoft.com/office/drawing/2014/main" id="{AE3B7880-F99E-CB9C-FCE0-4D94F6A60D02}"/>
+          <p:cNvPr id="16" name="Picture 15" descr="A picture containing text, dog, mammal&#10;&#10;Description automatically generated">
+            <a:extLst>
+              <a:ext uri="{FF2B5EF4-FFF2-40B4-BE49-F238E27FC236}">
+                <a16:creationId xmlns:a16="http://schemas.microsoft.com/office/drawing/2014/main" id="{097E958B-5CA1-182A-8085-901B347DF09A}"/>
+              </a:ext>
+            </a:extLst>
+          </p:cNvPr>
+          <p:cNvPicPr>
+            <a:picLocks noChangeAspect="1"/>
+          </p:cNvPicPr>
+          <p:nvPr/>
+        </p:nvPicPr>
+        <p:blipFill>
+          <a:blip r:embed="rId3"/>
+          <a:stretch>
+            <a:fillRect/>
+          </a:stretch>
+        </p:blipFill>
+        <p:spPr>
+          <a:xfrm>
+            <a:off x="840765" y="4912095"/>
+            <a:ext cx="2794000" cy="1600200"/>
+          </a:xfrm>
+          <a:prstGeom prst="rect">
+            <a:avLst/>
+          </a:prstGeom>
+        </p:spPr>
+      </p:pic>
+      <p:pic>
+        <p:nvPicPr>
+          <p:cNvPr id="1030" name="Picture 6" descr="Local Interpretable Model-Agnostic Explanations (LIME): An Introduction –  O'Reilly">
+            <a:extLst>
+              <a:ext uri="{FF2B5EF4-FFF2-40B4-BE49-F238E27FC236}">
+                <a16:creationId xmlns:a16="http://schemas.microsoft.com/office/drawing/2014/main" id="{DF91EFAF-1908-FD3E-82D7-447721A54B21}"/>
               </a:ext>
             </a:extLst>
           </p:cNvPr>
@@ -5557,7 +6323,7 @@
           <p:nvPr/>
         </p:nvPicPr>
         <p:blipFill>
-          <a:blip r:embed="rId3">
+          <a:blip r:embed="rId4">
             <a:extLst>
               <a:ext uri="{28A0092B-C50C-407E-A947-70E740481C1C}">
                 <a14:useLocalDpi xmlns:a14="http://schemas.microsoft.com/office/drawing/2010/main" val="0"/>
@@ -5571,8 +6337,8 @@
         </p:blipFill>
         <p:spPr bwMode="auto">
           <a:xfrm>
-            <a:off x="6921500" y="2662238"/>
-            <a:ext cx="4864100" cy="3673246"/>
+            <a:off x="840765" y="2371495"/>
+            <a:ext cx="4887769" cy="2352875"/>
           </a:xfrm>
           <a:prstGeom prst="rect">
             <a:avLst/>
@@ -5591,70 +6357,203 @@
       </p:pic>
       <p:sp>
         <p:nvSpPr>
-          <p:cNvPr id="9" name="Title 3">
-            <a:extLst>
-              <a:ext uri="{FF2B5EF4-FFF2-40B4-BE49-F238E27FC236}">
-                <a16:creationId xmlns:a16="http://schemas.microsoft.com/office/drawing/2014/main" id="{ABF68AC8-B500-9ADF-94E7-9AE9B21BCAA8}"/>
-              </a:ext>
-            </a:extLst>
-          </p:cNvPr>
-          <p:cNvSpPr txBox="1">
-            <a:spLocks/>
-          </p:cNvSpPr>
+          <p:cNvPr id="21" name="TextBox 20">
+            <a:extLst>
+              <a:ext uri="{FF2B5EF4-FFF2-40B4-BE49-F238E27FC236}">
+                <a16:creationId xmlns:a16="http://schemas.microsoft.com/office/drawing/2014/main" id="{9806194A-F776-FBA5-83AC-6C8F80BDB412}"/>
+              </a:ext>
+            </a:extLst>
+          </p:cNvPr>
+          <p:cNvSpPr txBox="1"/>
           <p:nvPr/>
         </p:nvSpPr>
         <p:spPr>
           <a:xfrm>
-            <a:off x="5930900" y="4144963"/>
-            <a:ext cx="863600" cy="808039"/>
+            <a:off x="3580493" y="6034855"/>
+            <a:ext cx="2223407" cy="523220"/>
           </a:xfrm>
           <a:prstGeom prst="rect">
             <a:avLst/>
           </a:prstGeom>
+          <a:noFill/>
         </p:spPr>
         <p:txBody>
-          <a:bodyPr vert="horz" lIns="91440" tIns="45720" rIns="91440" bIns="45720" rtlCol="0" anchor="t">
-            <a:normAutofit/>
+          <a:bodyPr wrap="square" rtlCol="0">
+            <a:spAutoFit/>
           </a:bodyPr>
-          <a:lstStyle>
-            <a:lvl1pPr algn="l" defTabSz="914400" rtl="0" eaLnBrk="1" latinLnBrk="0" hangingPunct="1">
-              <a:lnSpc>
-                <a:spcPct val="90000"/>
-              </a:lnSpc>
-              <a:spcBef>
-                <a:spcPct val="0"/>
-              </a:spcBef>
-              <a:buNone/>
-              <a:defRPr lang="en-US" sz="4000" b="1" kern="1200">
+          <a:lstStyle/>
+          <a:p>
+            <a:r>
+              <a:rPr lang="en-NL" sz="1400" dirty="0">
                 <a:solidFill>
-                  <a:schemeClr val="accent3"/>
+                  <a:schemeClr val="bg1">
+                    <a:lumMod val="50000"/>
+                  </a:schemeClr>
                 </a:solidFill>
-                <a:latin typeface="+mj-lt"/>
-                <a:ea typeface="+mn-ea"/>
-                <a:cs typeface="+mn-cs"/>
-              </a:defRPr>
-            </a:lvl1pPr>
-          </a:lstStyle>
-          <a:p>
-            <a:pPr fontAlgn="auto">
-              <a:spcAft>
-                <a:spcPts val="0"/>
-              </a:spcAft>
-            </a:pPr>
-            <a:r>
-              <a:rPr lang="en-NL" dirty="0">
-                <a:sym typeface="Wingdings" pitchFamily="2" charset="2"/>
               </a:rPr>
-              <a:t></a:t>
-            </a:r>
-            <a:endParaRPr lang="en-NL" dirty="0"/>
+              <a:t>Anchors // Ribeiro, Singh and Guestrin, 2018</a:t>
+            </a:r>
+          </a:p>
+        </p:txBody>
+      </p:sp>
+      <p:pic>
+        <p:nvPicPr>
+          <p:cNvPr id="1032" name="Picture 8">
+            <a:extLst>
+              <a:ext uri="{FF2B5EF4-FFF2-40B4-BE49-F238E27FC236}">
+                <a16:creationId xmlns:a16="http://schemas.microsoft.com/office/drawing/2014/main" id="{E642B107-25B9-3FEB-8CA4-F0CD39918AAF}"/>
+              </a:ext>
+            </a:extLst>
+          </p:cNvPr>
+          <p:cNvPicPr>
+            <a:picLocks noChangeAspect="1" noChangeArrowheads="1"/>
+          </p:cNvPicPr>
+          <p:nvPr/>
+        </p:nvPicPr>
+        <p:blipFill rotWithShape="1">
+          <a:blip r:embed="rId5">
+            <a:extLst>
+              <a:ext uri="{28A0092B-C50C-407E-A947-70E740481C1C}">
+                <a14:useLocalDpi xmlns:a14="http://schemas.microsoft.com/office/drawing/2010/main" val="0"/>
+              </a:ext>
+            </a:extLst>
+          </a:blip>
+          <a:srcRect t="38946"/>
+          <a:stretch/>
+        </p:blipFill>
+        <p:spPr bwMode="auto">
+          <a:xfrm>
+            <a:off x="6052494" y="2371495"/>
+            <a:ext cx="4635500" cy="2201863"/>
+          </a:xfrm>
+          <a:prstGeom prst="rect">
+            <a:avLst/>
+          </a:prstGeom>
+          <a:noFill/>
+          <a:extLst>
+            <a:ext uri="{909E8E84-426E-40DD-AFC4-6F175D3DCCD1}">
+              <a14:hiddenFill xmlns:a14="http://schemas.microsoft.com/office/drawing/2010/main">
+                <a:solidFill>
+                  <a:srgbClr val="FFFFFF"/>
+                </a:solidFill>
+              </a14:hiddenFill>
+            </a:ext>
+          </a:extLst>
+        </p:spPr>
+      </p:pic>
+      <p:sp>
+        <p:nvSpPr>
+          <p:cNvPr id="17" name="TextBox 16">
+            <a:extLst>
+              <a:ext uri="{FF2B5EF4-FFF2-40B4-BE49-F238E27FC236}">
+                <a16:creationId xmlns:a16="http://schemas.microsoft.com/office/drawing/2014/main" id="{D99A8D89-E78E-3ABA-AAF5-38A3A9332778}"/>
+              </a:ext>
+            </a:extLst>
+          </p:cNvPr>
+          <p:cNvSpPr txBox="1"/>
+          <p:nvPr/>
+        </p:nvSpPr>
+        <p:spPr>
+          <a:xfrm>
+            <a:off x="10721687" y="2593825"/>
+            <a:ext cx="1238593" cy="954107"/>
+          </a:xfrm>
+          <a:prstGeom prst="rect">
+            <a:avLst/>
+          </a:prstGeom>
+          <a:noFill/>
+        </p:spPr>
+        <p:txBody>
+          <a:bodyPr wrap="square" rtlCol="0">
+            <a:spAutoFit/>
+          </a:bodyPr>
+          <a:lstStyle/>
+          <a:p>
+            <a:r>
+              <a:rPr lang="en-GB" sz="1400" dirty="0">
+                <a:solidFill>
+                  <a:schemeClr val="bg1">
+                    <a:lumMod val="50000"/>
+                  </a:schemeClr>
+                </a:solidFill>
+              </a:rPr>
+              <a:t>Scott M. Lundberg, </a:t>
+            </a:r>
+            <a:r>
+              <a:rPr lang="en-GB" sz="1400" dirty="0" err="1">
+                <a:solidFill>
+                  <a:schemeClr val="bg1">
+                    <a:lumMod val="50000"/>
+                  </a:schemeClr>
+                </a:solidFill>
+              </a:rPr>
+              <a:t>Su</a:t>
+            </a:r>
+            <a:r>
+              <a:rPr lang="en-GB" sz="1400" dirty="0">
+                <a:solidFill>
+                  <a:schemeClr val="bg1">
+                    <a:lumMod val="50000"/>
+                  </a:schemeClr>
+                </a:solidFill>
+              </a:rPr>
+              <a:t>-In Lee, 2017</a:t>
+            </a:r>
+            <a:endParaRPr lang="en-NL" sz="1400" dirty="0">
+              <a:solidFill>
+                <a:schemeClr val="bg1">
+                  <a:lumMod val="50000"/>
+                </a:schemeClr>
+              </a:solidFill>
+            </a:endParaRPr>
+          </a:p>
+        </p:txBody>
+      </p:sp>
+      <p:sp>
+        <p:nvSpPr>
+          <p:cNvPr id="24" name="TextBox 23">
+            <a:extLst>
+              <a:ext uri="{FF2B5EF4-FFF2-40B4-BE49-F238E27FC236}">
+                <a16:creationId xmlns:a16="http://schemas.microsoft.com/office/drawing/2014/main" id="{4ABAE9FF-65A3-EE35-0E79-FB3146E3CB4E}"/>
+              </a:ext>
+            </a:extLst>
+          </p:cNvPr>
+          <p:cNvSpPr txBox="1"/>
+          <p:nvPr/>
+        </p:nvSpPr>
+        <p:spPr>
+          <a:xfrm>
+            <a:off x="787400" y="2397040"/>
+            <a:ext cx="1929761" cy="523220"/>
+          </a:xfrm>
+          <a:prstGeom prst="rect">
+            <a:avLst/>
+          </a:prstGeom>
+          <a:noFill/>
+        </p:spPr>
+        <p:txBody>
+          <a:bodyPr wrap="square" rtlCol="0">
+            <a:spAutoFit/>
+          </a:bodyPr>
+          <a:lstStyle/>
+          <a:p>
+            <a:r>
+              <a:rPr lang="en-NL" sz="1400" dirty="0">
+                <a:solidFill>
+                  <a:schemeClr val="bg1">
+                    <a:lumMod val="50000"/>
+                  </a:schemeClr>
+                </a:solidFill>
+              </a:rPr>
+              <a:t>LIME // Ribeiro, Singh and Guestrin, 2016</a:t>
+            </a:r>
           </a:p>
         </p:txBody>
       </p:sp>
     </p:spTree>
     <p:extLst>
       <p:ext uri="{BB962C8B-B14F-4D97-AF65-F5344CB8AC3E}">
-        <p14:creationId xmlns:p14="http://schemas.microsoft.com/office/powerpoint/2010/main" val="3430759669"/>
+        <p14:creationId xmlns:p14="http://schemas.microsoft.com/office/powerpoint/2010/main" val="2255682061"/>
       </p:ext>
     </p:extLst>
   </p:cSld>
@@ -5700,7 +6599,7 @@
         <p:spPr>
           <a:xfrm>
             <a:off x="762000" y="1676400"/>
-            <a:ext cx="7302500" cy="4171950"/>
+            <a:ext cx="7962900" cy="4171950"/>
           </a:xfrm>
         </p:spPr>
         <p:txBody>
@@ -5710,14 +6609,23 @@
           <a:lstStyle/>
           <a:p>
             <a:r>
+              <a:rPr lang="en-GB" dirty="0"/>
+              <a:t>Goal: </a:t>
+            </a:r>
+            <a:r>
+              <a:rPr lang="en-GB" b="0" dirty="0"/>
+              <a:t>Understand what are the main features/interactions in the model</a:t>
+            </a:r>
+            <a:endParaRPr lang="en-GB" dirty="0"/>
+          </a:p>
+          <a:p>
+            <a:r>
+              <a:rPr lang="en-NL" dirty="0"/>
+              <a:t>Basic idea: </a:t>
+            </a:r>
+            <a:r>
               <a:rPr lang="en-NL" b="0" dirty="0"/>
-              <a:t>Goal: What are the main features</a:t>
-            </a:r>
-          </a:p>
-          <a:p>
-            <a:r>
-              <a:rPr lang="en-NL" b="0" dirty="0"/>
-              <a:t>Basic idea: Average individual predictions</a:t>
+              <a:t>Average individual predictions</a:t>
             </a:r>
           </a:p>
           <a:p>
@@ -5780,6 +6688,100 @@
           </a:p>
         </p:txBody>
       </p:sp>
+      <p:pic>
+        <p:nvPicPr>
+          <p:cNvPr id="12290" name="Picture 2">
+            <a:extLst>
+              <a:ext uri="{FF2B5EF4-FFF2-40B4-BE49-F238E27FC236}">
+                <a16:creationId xmlns:a16="http://schemas.microsoft.com/office/drawing/2014/main" id="{F46E4790-F34F-2B74-F478-4C6B599AEC69}"/>
+              </a:ext>
+            </a:extLst>
+          </p:cNvPr>
+          <p:cNvPicPr>
+            <a:picLocks noChangeAspect="1" noChangeArrowheads="1"/>
+          </p:cNvPicPr>
+          <p:nvPr/>
+        </p:nvPicPr>
+        <p:blipFill>
+          <a:blip r:embed="rId2">
+            <a:extLst>
+              <a:ext uri="{28A0092B-C50C-407E-A947-70E740481C1C}">
+                <a14:useLocalDpi xmlns:a14="http://schemas.microsoft.com/office/drawing/2010/main" val="0"/>
+              </a:ext>
+            </a:extLst>
+          </a:blip>
+          <a:srcRect/>
+          <a:stretch>
+            <a:fillRect/>
+          </a:stretch>
+        </p:blipFill>
+        <p:spPr bwMode="auto">
+          <a:xfrm>
+            <a:off x="661355" y="2662238"/>
+            <a:ext cx="5142545" cy="3673246"/>
+          </a:xfrm>
+          <a:prstGeom prst="rect">
+            <a:avLst/>
+          </a:prstGeom>
+          <a:noFill/>
+          <a:extLst>
+            <a:ext uri="{909E8E84-426E-40DD-AFC4-6F175D3DCCD1}">
+              <a14:hiddenFill xmlns:a14="http://schemas.microsoft.com/office/drawing/2010/main">
+                <a:solidFill>
+                  <a:srgbClr val="FFFFFF"/>
+                </a:solidFill>
+              </a14:hiddenFill>
+            </a:ext>
+          </a:extLst>
+        </p:spPr>
+      </p:pic>
+      <p:pic>
+        <p:nvPicPr>
+          <p:cNvPr id="8" name="Picture 2" descr="PDPs for the bicycle count prediction model and temperature, humidity and wind speed. The largest differences can be seen in the temperature. The hotter, the more bikes are rented. This trend goes up to 20 degrees Celsius, then flattens and drops slightly at 30. Marks on the x-axis indicate the data distribution.">
+            <a:extLst>
+              <a:ext uri="{FF2B5EF4-FFF2-40B4-BE49-F238E27FC236}">
+                <a16:creationId xmlns:a16="http://schemas.microsoft.com/office/drawing/2014/main" id="{AE3B7880-F99E-CB9C-FCE0-4D94F6A60D02}"/>
+              </a:ext>
+            </a:extLst>
+          </p:cNvPr>
+          <p:cNvPicPr>
+            <a:picLocks noChangeAspect="1" noChangeArrowheads="1"/>
+          </p:cNvPicPr>
+          <p:nvPr/>
+        </p:nvPicPr>
+        <p:blipFill>
+          <a:blip r:embed="rId3">
+            <a:extLst>
+              <a:ext uri="{28A0092B-C50C-407E-A947-70E740481C1C}">
+                <a14:useLocalDpi xmlns:a14="http://schemas.microsoft.com/office/drawing/2010/main" val="0"/>
+              </a:ext>
+            </a:extLst>
+          </a:blip>
+          <a:srcRect/>
+          <a:stretch>
+            <a:fillRect/>
+          </a:stretch>
+        </p:blipFill>
+        <p:spPr bwMode="auto">
+          <a:xfrm>
+            <a:off x="6921500" y="2662238"/>
+            <a:ext cx="4864100" cy="3673246"/>
+          </a:xfrm>
+          <a:prstGeom prst="rect">
+            <a:avLst/>
+          </a:prstGeom>
+          <a:noFill/>
+          <a:extLst>
+            <a:ext uri="{909E8E84-426E-40DD-AFC4-6F175D3DCCD1}">
+              <a14:hiddenFill xmlns:a14="http://schemas.microsoft.com/office/drawing/2010/main">
+                <a:solidFill>
+                  <a:srgbClr val="FFFFFF"/>
+                </a:solidFill>
+              </a14:hiddenFill>
+            </a:ext>
+          </a:extLst>
+        </p:spPr>
+      </p:pic>
       <p:sp>
         <p:nvSpPr>
           <p:cNvPr id="9" name="Title 3">
@@ -5842,147 +6844,92 @@
           </a:p>
         </p:txBody>
       </p:sp>
-      <p:pic>
-        <p:nvPicPr>
-          <p:cNvPr id="7" name="Picture 2" descr="SHAP values to explain the predicted cancer probabilities of two individuals. The baseline -- the average predicted probability -- is 0.066. The first woman has a low predicted risk of 0.06. Risk increasing effects such as STDs are offset by decreasing effects such as age. The second woman has a high predicted risk of 0.71. Age of 51 and 34 years of smoking increase her predicted cancer risk.">
-            <a:extLst>
-              <a:ext uri="{FF2B5EF4-FFF2-40B4-BE49-F238E27FC236}">
-                <a16:creationId xmlns:a16="http://schemas.microsoft.com/office/drawing/2014/main" id="{62205EA1-ABD3-A57A-92F0-B2C048AF5E6F}"/>
-              </a:ext>
-            </a:extLst>
-          </p:cNvPr>
-          <p:cNvPicPr>
-            <a:picLocks noChangeAspect="1" noChangeArrowheads="1"/>
-          </p:cNvPicPr>
+      <p:sp>
+        <p:nvSpPr>
+          <p:cNvPr id="3" name="TextBox 2">
+            <a:extLst>
+              <a:ext uri="{FF2B5EF4-FFF2-40B4-BE49-F238E27FC236}">
+                <a16:creationId xmlns:a16="http://schemas.microsoft.com/office/drawing/2014/main" id="{3D6826B6-E508-C8C3-986E-061C5B397C69}"/>
+              </a:ext>
+            </a:extLst>
+          </p:cNvPr>
+          <p:cNvSpPr txBox="1"/>
           <p:nvPr/>
-        </p:nvPicPr>
-        <p:blipFill rotWithShape="1">
-          <a:blip r:embed="rId2">
-            <a:extLst>
-              <a:ext uri="{28A0092B-C50C-407E-A947-70E740481C1C}">
-                <a14:useLocalDpi xmlns:a14="http://schemas.microsoft.com/office/drawing/2010/main" val="0"/>
-              </a:ext>
-            </a:extLst>
-          </a:blip>
-          <a:srcRect t="58861" b="14831"/>
-          <a:stretch/>
-        </p:blipFill>
-        <p:spPr bwMode="auto">
-          <a:xfrm>
-            <a:off x="622301" y="3122613"/>
-            <a:ext cx="5308600" cy="997565"/>
+        </p:nvSpPr>
+        <p:spPr>
+          <a:xfrm>
+            <a:off x="572455" y="6335484"/>
+            <a:ext cx="3340979" cy="307777"/>
           </a:xfrm>
           <a:prstGeom prst="rect">
             <a:avLst/>
           </a:prstGeom>
           <a:noFill/>
-          <a:extLst>
-            <a:ext uri="{909E8E84-426E-40DD-AFC4-6F175D3DCCD1}">
-              <a14:hiddenFill xmlns:a14="http://schemas.microsoft.com/office/drawing/2010/main">
+        </p:spPr>
+        <p:txBody>
+          <a:bodyPr wrap="none" rtlCol="0">
+            <a:spAutoFit/>
+          </a:bodyPr>
+          <a:lstStyle/>
+          <a:p>
+            <a:r>
+              <a:rPr lang="en-GB" sz="1400" dirty="0">
                 <a:solidFill>
-                  <a:srgbClr val="FFFFFF"/>
+                  <a:schemeClr val="bg1">
+                    <a:lumMod val="50000"/>
+                  </a:schemeClr>
                 </a:solidFill>
-              </a14:hiddenFill>
-            </a:ext>
-          </a:extLst>
-        </p:spPr>
-      </p:pic>
-      <p:pic>
-        <p:nvPicPr>
-          <p:cNvPr id="10" name="Picture 2" descr="SHAP values to explain the predicted cancer probabilities of two individuals. The baseline -- the average predicted probability -- is 0.066. The first woman has a low predicted risk of 0.06. Risk increasing effects such as STDs are offset by decreasing effects such as age. The second woman has a high predicted risk of 0.71. Age of 51 and 34 years of smoking increase her predicted cancer risk.">
-            <a:extLst>
-              <a:ext uri="{FF2B5EF4-FFF2-40B4-BE49-F238E27FC236}">
-                <a16:creationId xmlns:a16="http://schemas.microsoft.com/office/drawing/2014/main" id="{76D5029B-6EE3-D096-9E13-F773949BACC6}"/>
-              </a:ext>
-            </a:extLst>
-          </p:cNvPr>
-          <p:cNvPicPr>
-            <a:picLocks noChangeAspect="1" noChangeArrowheads="1"/>
-          </p:cNvPicPr>
+              </a:rPr>
+              <a:t>Individual Conditional Expectation (ICE)</a:t>
+            </a:r>
+          </a:p>
+        </p:txBody>
+      </p:sp>
+      <p:sp>
+        <p:nvSpPr>
+          <p:cNvPr id="10" name="TextBox 9">
+            <a:extLst>
+              <a:ext uri="{FF2B5EF4-FFF2-40B4-BE49-F238E27FC236}">
+                <a16:creationId xmlns:a16="http://schemas.microsoft.com/office/drawing/2014/main" id="{3B01B618-FDAD-0A60-E300-28922AC7D9B0}"/>
+              </a:ext>
+            </a:extLst>
+          </p:cNvPr>
+          <p:cNvSpPr txBox="1"/>
           <p:nvPr/>
-        </p:nvPicPr>
-        <p:blipFill rotWithShape="1">
-          <a:blip r:embed="rId2">
-            <a:extLst>
-              <a:ext uri="{28A0092B-C50C-407E-A947-70E740481C1C}">
-                <a14:useLocalDpi xmlns:a14="http://schemas.microsoft.com/office/drawing/2010/main" val="0"/>
-              </a:ext>
-            </a:extLst>
-          </a:blip>
-          <a:srcRect t="7396" b="66296"/>
-          <a:stretch/>
-        </p:blipFill>
-        <p:spPr bwMode="auto">
-          <a:xfrm>
-            <a:off x="622301" y="4506913"/>
-            <a:ext cx="5308600" cy="997565"/>
+        </p:nvSpPr>
+        <p:spPr>
+          <a:xfrm>
+            <a:off x="6794500" y="6335484"/>
+            <a:ext cx="2645276" cy="307777"/>
           </a:xfrm>
           <a:prstGeom prst="rect">
             <a:avLst/>
           </a:prstGeom>
           <a:noFill/>
-          <a:extLst>
-            <a:ext uri="{909E8E84-426E-40DD-AFC4-6F175D3DCCD1}">
-              <a14:hiddenFill xmlns:a14="http://schemas.microsoft.com/office/drawing/2010/main">
+        </p:spPr>
+        <p:txBody>
+          <a:bodyPr wrap="none" rtlCol="0">
+            <a:spAutoFit/>
+          </a:bodyPr>
+          <a:lstStyle/>
+          <a:p>
+            <a:r>
+              <a:rPr lang="en-GB" sz="1400" dirty="0">
                 <a:solidFill>
-                  <a:srgbClr val="FFFFFF"/>
+                  <a:schemeClr val="bg1">
+                    <a:lumMod val="50000"/>
+                  </a:schemeClr>
                 </a:solidFill>
-              </a14:hiddenFill>
-            </a:ext>
-          </a:extLst>
-        </p:spPr>
-      </p:pic>
-      <p:pic>
-        <p:nvPicPr>
-          <p:cNvPr id="11" name="Picture 4" descr="SHAP summary plot. Low number of years on hormonal contraceptives reduce the predicted cancer risk, a large number of years increases the risk. Your regular reminder: All effects describe the behavior of the model and are not necessarily causal in the real world.">
-            <a:extLst>
-              <a:ext uri="{FF2B5EF4-FFF2-40B4-BE49-F238E27FC236}">
-                <a16:creationId xmlns:a16="http://schemas.microsoft.com/office/drawing/2014/main" id="{E0EB46EE-24FA-C02E-9D64-71781B7B35CB}"/>
-              </a:ext>
-            </a:extLst>
-          </p:cNvPr>
-          <p:cNvPicPr>
-            <a:picLocks noChangeAspect="1" noChangeArrowheads="1"/>
-          </p:cNvPicPr>
-          <p:nvPr/>
-        </p:nvPicPr>
-        <p:blipFill>
-          <a:blip r:embed="rId3">
-            <a:extLst>
-              <a:ext uri="{28A0092B-C50C-407E-A947-70E740481C1C}">
-                <a14:useLocalDpi xmlns:a14="http://schemas.microsoft.com/office/drawing/2010/main" val="0"/>
-              </a:ext>
-            </a:extLst>
-          </a:blip>
-          <a:srcRect/>
-          <a:stretch>
-            <a:fillRect/>
-          </a:stretch>
-        </p:blipFill>
-        <p:spPr bwMode="auto">
-          <a:xfrm>
-            <a:off x="6070600" y="2373313"/>
-            <a:ext cx="6078069" cy="4267199"/>
-          </a:xfrm>
-          <a:prstGeom prst="rect">
-            <a:avLst/>
-          </a:prstGeom>
-          <a:noFill/>
-          <a:extLst>
-            <a:ext uri="{909E8E84-426E-40DD-AFC4-6F175D3DCCD1}">
-              <a14:hiddenFill xmlns:a14="http://schemas.microsoft.com/office/drawing/2010/main">
-                <a:solidFill>
-                  <a:srgbClr val="FFFFFF"/>
-                </a:solidFill>
-              </a14:hiddenFill>
-            </a:ext>
-          </a:extLst>
-        </p:spPr>
-      </p:pic>
+              </a:rPr>
+              <a:t>Partial Dependency Plot (PDP)</a:t>
+            </a:r>
+          </a:p>
+        </p:txBody>
+      </p:sp>
     </p:spTree>
     <p:extLst>
       <p:ext uri="{BB962C8B-B14F-4D97-AF65-F5344CB8AC3E}">
-        <p14:creationId xmlns:p14="http://schemas.microsoft.com/office/powerpoint/2010/main" val="3555588826"/>
+        <p14:creationId xmlns:p14="http://schemas.microsoft.com/office/powerpoint/2010/main" val="3430759669"/>
       </p:ext>
     </p:extLst>
   </p:cSld>
@@ -6234,154 +7181,10 @@
       </p:grpSpPr>
       <p:sp>
         <p:nvSpPr>
-          <p:cNvPr id="2" name="Text Placeholder 1">
-            <a:extLst>
-              <a:ext uri="{FF2B5EF4-FFF2-40B4-BE49-F238E27FC236}">
-                <a16:creationId xmlns:a16="http://schemas.microsoft.com/office/drawing/2014/main" id="{AB1C5EA4-9F16-8E9D-39EA-FD3EC5434C4C}"/>
-              </a:ext>
-            </a:extLst>
-          </p:cNvPr>
-          <p:cNvSpPr>
-            <a:spLocks noGrp="1"/>
-          </p:cNvSpPr>
-          <p:nvPr>
-            <p:ph type="body" sz="quarter" idx="11"/>
-          </p:nvPr>
-        </p:nvSpPr>
-        <p:spPr>
-          <a:xfrm>
-            <a:off x="762000" y="1593850"/>
-            <a:ext cx="10871200" cy="4324350"/>
-          </a:xfrm>
-        </p:spPr>
-        <p:txBody>
-          <a:bodyPr>
-            <a:normAutofit lnSpcReduction="10000"/>
-          </a:bodyPr>
-          <a:lstStyle/>
-          <a:p>
-            <a:r>
-              <a:rPr lang="en-US" b="0" dirty="0"/>
-              <a:t>Synthetic data:</a:t>
-            </a:r>
-          </a:p>
-          <a:p>
-            <a:pPr marL="285750" indent="-285750">
-              <a:buFont typeface="Arial" panose="020B0604020202020204" pitchFamily="34" charset="0"/>
-              <a:buChar char="•"/>
-            </a:pPr>
-            <a:r>
-              <a:rPr lang="en-US" b="0" dirty="0"/>
-              <a:t>X = 105 features (100 quantitative, 5 categorical)</a:t>
-            </a:r>
-          </a:p>
-          <a:p>
-            <a:pPr marL="285750" indent="-285750">
-              <a:buFont typeface="Arial" panose="020B0604020202020204" pitchFamily="34" charset="0"/>
-              <a:buChar char="•"/>
-            </a:pPr>
-            <a:r>
-              <a:rPr lang="en-US" b="0" dirty="0"/>
-              <a:t>Y = Quantitative response (depending on interaction between 3 quantitative and 1 categorical)</a:t>
-            </a:r>
-          </a:p>
-          <a:p>
-            <a:pPr marL="285750" indent="-285750">
-              <a:buFont typeface="Arial" panose="020B0604020202020204" pitchFamily="34" charset="0"/>
-              <a:buChar char="•"/>
-            </a:pPr>
-            <a:endParaRPr lang="en-US" b="0" dirty="0"/>
-          </a:p>
-          <a:p>
-            <a:r>
-              <a:rPr lang="en-US" b="0" dirty="0"/>
-              <a:t>Goal:</a:t>
-            </a:r>
-          </a:p>
-          <a:p>
-            <a:pPr marL="285750" indent="-285750">
-              <a:buFont typeface="Arial" panose="020B0604020202020204" pitchFamily="34" charset="0"/>
-              <a:buChar char="•"/>
-            </a:pPr>
-            <a:r>
-              <a:rPr lang="en-US" b="0" dirty="0"/>
-              <a:t>Try two methods: LASSO regression and </a:t>
-            </a:r>
-            <a:r>
-              <a:rPr lang="en-US" b="0" dirty="0" err="1"/>
-              <a:t>XGBoost</a:t>
-            </a:r>
-            <a:endParaRPr lang="en-US" b="0" dirty="0"/>
-          </a:p>
-          <a:p>
-            <a:pPr marL="285750" indent="-285750">
-              <a:buFont typeface="Arial" panose="020B0604020202020204" pitchFamily="34" charset="0"/>
-              <a:buChar char="•"/>
-            </a:pPr>
-            <a:r>
-              <a:rPr lang="en-US" b="0" dirty="0"/>
-              <a:t>Use feature importance to understand the results of </a:t>
-            </a:r>
-            <a:r>
-              <a:rPr lang="en-US" b="0" dirty="0" err="1"/>
-              <a:t>XGBoost</a:t>
-            </a:r>
-            <a:endParaRPr lang="en-US" b="0" dirty="0"/>
-          </a:p>
-          <a:p>
-            <a:endParaRPr lang="en-US" b="0" dirty="0"/>
-          </a:p>
-          <a:p>
-            <a:r>
-              <a:rPr lang="en-US" b="0" dirty="0"/>
-              <a:t>Instructions:</a:t>
-            </a:r>
-          </a:p>
-          <a:p>
-            <a:pPr marL="285750" indent="-285750">
-              <a:buFont typeface="Arial" panose="020B0604020202020204" pitchFamily="34" charset="0"/>
-              <a:buChar char="•"/>
-            </a:pPr>
-            <a:r>
-              <a:rPr lang="en-US" b="0" dirty="0"/>
-              <a:t>Read the code line by line</a:t>
-            </a:r>
-          </a:p>
-          <a:p>
-            <a:pPr marL="285750" indent="-285750">
-              <a:buFont typeface="Arial" panose="020B0604020202020204" pitchFamily="34" charset="0"/>
-              <a:buChar char="•"/>
-            </a:pPr>
-            <a:r>
-              <a:rPr lang="en-US" b="0" dirty="0"/>
-              <a:t>Run de code</a:t>
-            </a:r>
-          </a:p>
-          <a:p>
-            <a:pPr marL="285750" indent="-285750">
-              <a:buFont typeface="Arial" panose="020B0604020202020204" pitchFamily="34" charset="0"/>
-              <a:buChar char="•"/>
-            </a:pPr>
-            <a:r>
-              <a:rPr lang="en-US" b="0" dirty="0"/>
-              <a:t>Adapt the code with other possible outputs in the data (e.g. more number of features)</a:t>
-            </a:r>
-          </a:p>
-          <a:p>
-            <a:pPr marL="285750" indent="-285750">
-              <a:buFont typeface="Arial" panose="020B0604020202020204" pitchFamily="34" charset="0"/>
-              <a:buChar char="•"/>
-            </a:pPr>
-            <a:endParaRPr lang="en-US" b="0" dirty="0"/>
-          </a:p>
-        </p:txBody>
-      </p:sp>
-      <p:sp>
-        <p:nvSpPr>
           <p:cNvPr id="4" name="Title 3">
             <a:extLst>
               <a:ext uri="{FF2B5EF4-FFF2-40B4-BE49-F238E27FC236}">
-                <a16:creationId xmlns:a16="http://schemas.microsoft.com/office/drawing/2014/main" id="{1DA1E466-424B-F32A-8DAD-C46B62ADE7BE}"/>
+                <a16:creationId xmlns:a16="http://schemas.microsoft.com/office/drawing/2014/main" id="{AB72E25C-C9A1-533A-DF30-FD6D27D2376B}"/>
               </a:ext>
             </a:extLst>
           </p:cNvPr>
@@ -6395,7 +7198,7 @@
         <p:spPr>
           <a:xfrm>
             <a:off x="762000" y="715961"/>
-            <a:ext cx="8239496" cy="1189038"/>
+            <a:ext cx="10083800" cy="1189038"/>
           </a:xfrm>
         </p:spPr>
         <p:txBody>
@@ -6403,17 +7206,250 @@
           <a:lstStyle/>
           <a:p>
             <a:r>
-              <a:rPr lang="en-US" dirty="0"/>
-              <a:t>Exercise</a:t>
+              <a:rPr lang="en-NL" dirty="0"/>
+              <a:t>2: Local </a:t>
+            </a:r>
+            <a:r>
+              <a:rPr lang="en-NL" dirty="0">
+                <a:sym typeface="Wingdings" pitchFamily="2" charset="2"/>
+              </a:rPr>
+              <a:t> Global </a:t>
+            </a:r>
+            <a:r>
+              <a:rPr lang="en-NL" dirty="0"/>
+              <a:t>interpretability</a:t>
+            </a:r>
+          </a:p>
+        </p:txBody>
+      </p:sp>
+      <p:sp>
+        <p:nvSpPr>
+          <p:cNvPr id="9" name="Title 3">
+            <a:extLst>
+              <a:ext uri="{FF2B5EF4-FFF2-40B4-BE49-F238E27FC236}">
+                <a16:creationId xmlns:a16="http://schemas.microsoft.com/office/drawing/2014/main" id="{ABF68AC8-B500-9ADF-94E7-9AE9B21BCAA8}"/>
+              </a:ext>
+            </a:extLst>
+          </p:cNvPr>
+          <p:cNvSpPr txBox="1">
+            <a:spLocks/>
+          </p:cNvSpPr>
+          <p:nvPr/>
+        </p:nvSpPr>
+        <p:spPr>
+          <a:xfrm>
+            <a:off x="5930900" y="4144963"/>
+            <a:ext cx="863600" cy="808039"/>
+          </a:xfrm>
+          <a:prstGeom prst="rect">
+            <a:avLst/>
+          </a:prstGeom>
+        </p:spPr>
+        <p:txBody>
+          <a:bodyPr vert="horz" lIns="91440" tIns="45720" rIns="91440" bIns="45720" rtlCol="0" anchor="t">
+            <a:normAutofit/>
+          </a:bodyPr>
+          <a:lstStyle>
+            <a:lvl1pPr algn="l" defTabSz="914400" rtl="0" eaLnBrk="1" latinLnBrk="0" hangingPunct="1">
+              <a:lnSpc>
+                <a:spcPct val="90000"/>
+              </a:lnSpc>
+              <a:spcBef>
+                <a:spcPct val="0"/>
+              </a:spcBef>
+              <a:buNone/>
+              <a:defRPr lang="en-US" sz="4000" b="1" kern="1200">
+                <a:solidFill>
+                  <a:schemeClr val="accent3"/>
+                </a:solidFill>
+                <a:latin typeface="+mj-lt"/>
+                <a:ea typeface="+mn-ea"/>
+                <a:cs typeface="+mn-cs"/>
+              </a:defRPr>
+            </a:lvl1pPr>
+          </a:lstStyle>
+          <a:p>
+            <a:pPr fontAlgn="auto">
+              <a:spcAft>
+                <a:spcPts val="0"/>
+              </a:spcAft>
+            </a:pPr>
+            <a:r>
+              <a:rPr lang="en-NL" dirty="0">
+                <a:sym typeface="Wingdings" pitchFamily="2" charset="2"/>
+              </a:rPr>
+              <a:t></a:t>
             </a:r>
             <a:endParaRPr lang="en-NL" dirty="0"/>
+          </a:p>
+        </p:txBody>
+      </p:sp>
+      <p:pic>
+        <p:nvPicPr>
+          <p:cNvPr id="7" name="Picture 2" descr="SHAP values to explain the predicted cancer probabilities of two individuals. The baseline -- the average predicted probability -- is 0.066. The first woman has a low predicted risk of 0.06. Risk increasing effects such as STDs are offset by decreasing effects such as age. The second woman has a high predicted risk of 0.71. Age of 51 and 34 years of smoking increase her predicted cancer risk.">
+            <a:extLst>
+              <a:ext uri="{FF2B5EF4-FFF2-40B4-BE49-F238E27FC236}">
+                <a16:creationId xmlns:a16="http://schemas.microsoft.com/office/drawing/2014/main" id="{62205EA1-ABD3-A57A-92F0-B2C048AF5E6F}"/>
+              </a:ext>
+            </a:extLst>
+          </p:cNvPr>
+          <p:cNvPicPr>
+            <a:picLocks noChangeAspect="1" noChangeArrowheads="1"/>
+          </p:cNvPicPr>
+          <p:nvPr/>
+        </p:nvPicPr>
+        <p:blipFill rotWithShape="1">
+          <a:blip r:embed="rId2">
+            <a:extLst>
+              <a:ext uri="{28A0092B-C50C-407E-A947-70E740481C1C}">
+                <a14:useLocalDpi xmlns:a14="http://schemas.microsoft.com/office/drawing/2010/main" val="0"/>
+              </a:ext>
+            </a:extLst>
+          </a:blip>
+          <a:srcRect t="58861" b="14831"/>
+          <a:stretch/>
+        </p:blipFill>
+        <p:spPr bwMode="auto">
+          <a:xfrm>
+            <a:off x="622301" y="3122613"/>
+            <a:ext cx="5308600" cy="997565"/>
+          </a:xfrm>
+          <a:prstGeom prst="rect">
+            <a:avLst/>
+          </a:prstGeom>
+          <a:noFill/>
+          <a:extLst>
+            <a:ext uri="{909E8E84-426E-40DD-AFC4-6F175D3DCCD1}">
+              <a14:hiddenFill xmlns:a14="http://schemas.microsoft.com/office/drawing/2010/main">
+                <a:solidFill>
+                  <a:srgbClr val="FFFFFF"/>
+                </a:solidFill>
+              </a14:hiddenFill>
+            </a:ext>
+          </a:extLst>
+        </p:spPr>
+      </p:pic>
+      <p:pic>
+        <p:nvPicPr>
+          <p:cNvPr id="10" name="Picture 2" descr="SHAP values to explain the predicted cancer probabilities of two individuals. The baseline -- the average predicted probability -- is 0.066. The first woman has a low predicted risk of 0.06. Risk increasing effects such as STDs are offset by decreasing effects such as age. The second woman has a high predicted risk of 0.71. Age of 51 and 34 years of smoking increase her predicted cancer risk.">
+            <a:extLst>
+              <a:ext uri="{FF2B5EF4-FFF2-40B4-BE49-F238E27FC236}">
+                <a16:creationId xmlns:a16="http://schemas.microsoft.com/office/drawing/2014/main" id="{76D5029B-6EE3-D096-9E13-F773949BACC6}"/>
+              </a:ext>
+            </a:extLst>
+          </p:cNvPr>
+          <p:cNvPicPr>
+            <a:picLocks noChangeAspect="1" noChangeArrowheads="1"/>
+          </p:cNvPicPr>
+          <p:nvPr/>
+        </p:nvPicPr>
+        <p:blipFill rotWithShape="1">
+          <a:blip r:embed="rId2">
+            <a:extLst>
+              <a:ext uri="{28A0092B-C50C-407E-A947-70E740481C1C}">
+                <a14:useLocalDpi xmlns:a14="http://schemas.microsoft.com/office/drawing/2010/main" val="0"/>
+              </a:ext>
+            </a:extLst>
+          </a:blip>
+          <a:srcRect t="7396" b="66296"/>
+          <a:stretch/>
+        </p:blipFill>
+        <p:spPr bwMode="auto">
+          <a:xfrm>
+            <a:off x="622301" y="4506913"/>
+            <a:ext cx="5308600" cy="997565"/>
+          </a:xfrm>
+          <a:prstGeom prst="rect">
+            <a:avLst/>
+          </a:prstGeom>
+          <a:noFill/>
+          <a:extLst>
+            <a:ext uri="{909E8E84-426E-40DD-AFC4-6F175D3DCCD1}">
+              <a14:hiddenFill xmlns:a14="http://schemas.microsoft.com/office/drawing/2010/main">
+                <a:solidFill>
+                  <a:srgbClr val="FFFFFF"/>
+                </a:solidFill>
+              </a14:hiddenFill>
+            </a:ext>
+          </a:extLst>
+        </p:spPr>
+      </p:pic>
+      <p:pic>
+        <p:nvPicPr>
+          <p:cNvPr id="11" name="Picture 4" descr="SHAP summary plot. Low number of years on hormonal contraceptives reduce the predicted cancer risk, a large number of years increases the risk. Your regular reminder: All effects describe the behavior of the model and are not necessarily causal in the real world.">
+            <a:extLst>
+              <a:ext uri="{FF2B5EF4-FFF2-40B4-BE49-F238E27FC236}">
+                <a16:creationId xmlns:a16="http://schemas.microsoft.com/office/drawing/2014/main" id="{E0EB46EE-24FA-C02E-9D64-71781B7B35CB}"/>
+              </a:ext>
+            </a:extLst>
+          </p:cNvPr>
+          <p:cNvPicPr>
+            <a:picLocks noChangeAspect="1" noChangeArrowheads="1"/>
+          </p:cNvPicPr>
+          <p:nvPr/>
+        </p:nvPicPr>
+        <p:blipFill>
+          <a:blip r:embed="rId3">
+            <a:extLst>
+              <a:ext uri="{28A0092B-C50C-407E-A947-70E740481C1C}">
+                <a14:useLocalDpi xmlns:a14="http://schemas.microsoft.com/office/drawing/2010/main" val="0"/>
+              </a:ext>
+            </a:extLst>
+          </a:blip>
+          <a:srcRect/>
+          <a:stretch>
+            <a:fillRect/>
+          </a:stretch>
+        </p:blipFill>
+        <p:spPr bwMode="auto">
+          <a:xfrm>
+            <a:off x="6070600" y="2373313"/>
+            <a:ext cx="6078069" cy="4267199"/>
+          </a:xfrm>
+          <a:prstGeom prst="rect">
+            <a:avLst/>
+          </a:prstGeom>
+          <a:noFill/>
+          <a:extLst>
+            <a:ext uri="{909E8E84-426E-40DD-AFC4-6F175D3DCCD1}">
+              <a14:hiddenFill xmlns:a14="http://schemas.microsoft.com/office/drawing/2010/main">
+                <a:solidFill>
+                  <a:srgbClr val="FFFFFF"/>
+                </a:solidFill>
+              </a14:hiddenFill>
+            </a:ext>
+          </a:extLst>
+        </p:spPr>
+      </p:pic>
+      <p:sp>
+        <p:nvSpPr>
+          <p:cNvPr id="5" name="Text Placeholder 4">
+            <a:extLst>
+              <a:ext uri="{FF2B5EF4-FFF2-40B4-BE49-F238E27FC236}">
+                <a16:creationId xmlns:a16="http://schemas.microsoft.com/office/drawing/2014/main" id="{3434EFB4-2148-9D4C-1BE2-5E1C01779868}"/>
+              </a:ext>
+            </a:extLst>
+          </p:cNvPr>
+          <p:cNvSpPr>
+            <a:spLocks noGrp="1"/>
+          </p:cNvSpPr>
+          <p:nvPr>
+            <p:ph type="body" sz="quarter" idx="11"/>
+          </p:nvPr>
+        </p:nvSpPr>
+        <p:spPr/>
+        <p:txBody>
+          <a:bodyPr/>
+          <a:lstStyle/>
+          <a:p>
+            <a:endParaRPr lang="en-NL"/>
           </a:p>
         </p:txBody>
       </p:sp>
     </p:spTree>
     <p:extLst>
       <p:ext uri="{BB962C8B-B14F-4D97-AF65-F5344CB8AC3E}">
-        <p14:creationId xmlns:p14="http://schemas.microsoft.com/office/powerpoint/2010/main" val="2658202092"/>
+        <p14:creationId xmlns:p14="http://schemas.microsoft.com/office/powerpoint/2010/main" val="3555588826"/>
       </p:ext>
     </p:extLst>
   </p:cSld>
@@ -6458,109 +7494,139 @@
         </p:nvSpPr>
         <p:spPr>
           <a:xfrm>
-            <a:off x="761999" y="1905000"/>
-            <a:ext cx="8851557" cy="3670300"/>
+            <a:off x="762000" y="1593850"/>
+            <a:ext cx="10871200" cy="4324350"/>
           </a:xfrm>
         </p:spPr>
         <p:txBody>
           <a:bodyPr>
-            <a:normAutofit lnSpcReduction="10000"/>
+            <a:normAutofit fontScale="92500" lnSpcReduction="10000"/>
           </a:bodyPr>
           <a:lstStyle/>
           <a:p>
             <a:r>
-              <a:rPr lang="en-US" dirty="0"/>
-              <a:t>Missing data imputation</a:t>
-            </a:r>
-          </a:p>
-          <a:p>
-            <a:endParaRPr lang="en-GB" dirty="0"/>
-          </a:p>
-          <a:p>
-            <a:r>
-              <a:rPr lang="en-US" altLang="en-US" dirty="0"/>
-              <a:t>Prediction</a:t>
-            </a:r>
-            <a:r>
-              <a:rPr lang="en-US" altLang="en-US" b="0" dirty="0"/>
-              <a:t> of outcomes with interpretability at the individual level (LIME, SHAP)</a:t>
-            </a:r>
-          </a:p>
-          <a:p>
-            <a:endParaRPr lang="en-GB" dirty="0"/>
-          </a:p>
-          <a:p>
-            <a:r>
-              <a:rPr lang="en-GB" dirty="0"/>
-              <a:t>Theory building:</a:t>
+              <a:rPr lang="en-US" b="0" dirty="0"/>
+              <a:t>Synthetic data:</a:t>
             </a:r>
           </a:p>
           <a:p>
             <a:pPr marL="285750" indent="-285750">
-              <a:buFontTx/>
-              <a:buChar char="-"/>
+              <a:buFont typeface="Arial" panose="020B0604020202020204" pitchFamily="34" charset="0"/>
+              <a:buChar char="•"/>
             </a:pPr>
             <a:r>
-              <a:rPr lang="en-GB" b="0" dirty="0"/>
-              <a:t>Able to detect higher-order interactions and other complicated </a:t>
-            </a:r>
-            <a:r>
               <a:rPr lang="en-US" b="0" dirty="0"/>
-              <a:t>responses</a:t>
+              <a:t>X = 105 features (100 quantitative, 5 categorical)</a:t>
             </a:r>
           </a:p>
           <a:p>
             <a:pPr marL="285750" indent="-285750">
-              <a:buFontTx/>
-              <a:buChar char="-"/>
+              <a:buFont typeface="Arial" panose="020B0604020202020204" pitchFamily="34" charset="0"/>
+              <a:buChar char="•"/>
             </a:pPr>
             <a:r>
               <a:rPr lang="en-US" b="0" dirty="0"/>
-              <a:t>Run the ML model </a:t>
-            </a:r>
-            <a:r>
-              <a:rPr lang="en-US" b="0" dirty="0">
-                <a:sym typeface="Wingdings" pitchFamily="2" charset="2"/>
-              </a:rPr>
-              <a:t> Does it increase prediction compared to the traditional model?</a:t>
-            </a:r>
-          </a:p>
-          <a:p>
-            <a:pPr marL="569214" lvl="1" indent="-285750">
-              <a:buFontTx/>
-              <a:buChar char="-"/>
+              <a:t>Y = Quantitative response (depending on interaction between 3 quantitative and 1 categorical)</a:t>
+            </a:r>
+          </a:p>
+          <a:p>
+            <a:pPr marL="285750" indent="-285750">
+              <a:buFont typeface="Arial" panose="020B0604020202020204" pitchFamily="34" charset="0"/>
+              <a:buChar char="•"/>
             </a:pPr>
+            <a:endParaRPr lang="en-US" b="0" dirty="0"/>
+          </a:p>
+          <a:p>
             <a:r>
               <a:rPr lang="en-US" b="0" dirty="0"/>
-              <a:t>You may be missing an important variable </a:t>
-            </a:r>
-          </a:p>
-          <a:p>
-            <a:pPr marL="569214" lvl="1" indent="-285750">
-              <a:buFontTx/>
-              <a:buChar char="-"/>
+              <a:t>Goal:</a:t>
+            </a:r>
+          </a:p>
+          <a:p>
+            <a:pPr marL="285750" indent="-285750">
+              <a:buFont typeface="Arial" panose="020B0604020202020204" pitchFamily="34" charset="0"/>
+              <a:buChar char="•"/>
             </a:pPr>
             <a:r>
-              <a:rPr lang="en-US" dirty="0"/>
-              <a:t>Your model may be missing interactions</a:t>
-            </a:r>
-          </a:p>
-          <a:p>
-            <a:pPr marL="569214" lvl="1" indent="-285750">
-              <a:buFontTx/>
-              <a:buChar char="-"/>
+              <a:rPr lang="en-US" b="0" dirty="0"/>
+              <a:t>Try two methods: LASSO regression and </a:t>
+            </a:r>
+            <a:r>
+              <a:rPr lang="en-US" b="0" dirty="0" err="1"/>
+              <a:t>XGBoost</a:t>
+            </a:r>
+            <a:endParaRPr lang="en-US" b="0" dirty="0"/>
+          </a:p>
+          <a:p>
+            <a:pPr marL="285750" indent="-285750">
+              <a:buFont typeface="Arial" panose="020B0604020202020204" pitchFamily="34" charset="0"/>
+              <a:buChar char="•"/>
             </a:pPr>
             <a:r>
-              <a:rPr lang="en-US" dirty="0"/>
-              <a:t>Evaluate using interpretability tools</a:t>
-            </a:r>
-          </a:p>
-          <a:p>
-            <a:pPr marL="569214" lvl="1" indent="-285750">
-              <a:buFontTx/>
-              <a:buChar char="-"/>
+              <a:rPr lang="en-US" b="0" dirty="0"/>
+              <a:t>Hyperparameter tuning using cross-validation</a:t>
+            </a:r>
+          </a:p>
+          <a:p>
+            <a:pPr marL="285750" indent="-285750">
+              <a:buFont typeface="Arial" panose="020B0604020202020204" pitchFamily="34" charset="0"/>
+              <a:buChar char="•"/>
             </a:pPr>
-            <a:endParaRPr lang="en-US" dirty="0"/>
+            <a:r>
+              <a:rPr lang="en-US" b="0" dirty="0"/>
+              <a:t>Use feature importance to understand the results of </a:t>
+            </a:r>
+            <a:r>
+              <a:rPr lang="en-US" b="0" dirty="0" err="1"/>
+              <a:t>XGBoost</a:t>
+            </a:r>
+            <a:endParaRPr lang="en-US" b="0" dirty="0"/>
+          </a:p>
+          <a:p>
+            <a:endParaRPr lang="en-US" b="0" dirty="0"/>
+          </a:p>
+          <a:p>
+            <a:r>
+              <a:rPr lang="en-US" b="0" dirty="0"/>
+              <a:t>Instructions: (in groups)</a:t>
+            </a:r>
+          </a:p>
+          <a:p>
+            <a:pPr marL="285750" indent="-285750">
+              <a:buFont typeface="Arial" panose="020B0604020202020204" pitchFamily="34" charset="0"/>
+              <a:buChar char="•"/>
+            </a:pPr>
+            <a:r>
+              <a:rPr lang="en-US" b="0" dirty="0"/>
+              <a:t>Read the code line by line</a:t>
+            </a:r>
+          </a:p>
+          <a:p>
+            <a:pPr marL="285750" indent="-285750">
+              <a:buFont typeface="Arial" panose="020B0604020202020204" pitchFamily="34" charset="0"/>
+              <a:buChar char="•"/>
+            </a:pPr>
+            <a:r>
+              <a:rPr lang="en-US" b="0" dirty="0"/>
+              <a:t>Run de code</a:t>
+            </a:r>
+          </a:p>
+          <a:p>
+            <a:pPr marL="285750" indent="-285750">
+              <a:buFont typeface="Arial" panose="020B0604020202020204" pitchFamily="34" charset="0"/>
+              <a:buChar char="•"/>
+            </a:pPr>
+            <a:r>
+              <a:rPr lang="en-US" b="0" dirty="0"/>
+              <a:t>Adapt the code with other possible outputs in the data (e.g. increase number of features)</a:t>
+            </a:r>
+          </a:p>
+          <a:p>
+            <a:pPr marL="285750" indent="-285750">
+              <a:buFont typeface="Arial" panose="020B0604020202020204" pitchFamily="34" charset="0"/>
+              <a:buChar char="•"/>
+            </a:pPr>
+            <a:endParaRPr lang="en-US" b="0" dirty="0"/>
           </a:p>
         </p:txBody>
       </p:sp>
@@ -6582,8 +7648,8 @@
         </p:nvSpPr>
         <p:spPr>
           <a:xfrm>
-            <a:off x="761999" y="715961"/>
-            <a:ext cx="9878291" cy="1189038"/>
+            <a:off x="762000" y="715961"/>
+            <a:ext cx="8239496" cy="1189038"/>
           </a:xfrm>
         </p:spPr>
         <p:txBody>
@@ -6592,16 +7658,19 @@
           <a:p>
             <a:r>
               <a:rPr lang="en-US" dirty="0"/>
-              <a:t>Recap: uses of ML in epidemiology</a:t>
-            </a:r>
-            <a:endParaRPr lang="en-NL" dirty="0"/>
+              <a:t>Exercise (</a:t>
+            </a:r>
+            <a:r>
+              <a:rPr lang="en-NL" dirty="0"/>
+              <a:t>javier.science/ml_julius)</a:t>
+            </a:r>
           </a:p>
         </p:txBody>
       </p:sp>
     </p:spTree>
     <p:extLst>
       <p:ext uri="{BB962C8B-B14F-4D97-AF65-F5344CB8AC3E}">
-        <p14:creationId xmlns:p14="http://schemas.microsoft.com/office/powerpoint/2010/main" val="543179128"/>
+        <p14:creationId xmlns:p14="http://schemas.microsoft.com/office/powerpoint/2010/main" val="2658202092"/>
       </p:ext>
     </p:extLst>
   </p:cSld>
@@ -6647,21 +7716,40 @@
         <p:spPr>
           <a:xfrm>
             <a:off x="761999" y="1905000"/>
-            <a:ext cx="9982201" cy="3670300"/>
+            <a:ext cx="8851557" cy="3670300"/>
           </a:xfrm>
         </p:spPr>
         <p:txBody>
           <a:bodyPr>
-            <a:normAutofit/>
+            <a:normAutofit lnSpcReduction="10000"/>
           </a:bodyPr>
           <a:lstStyle/>
           <a:p>
+            <a:r>
+              <a:rPr lang="en-US" dirty="0"/>
+              <a:t>Missing data imputation</a:t>
+            </a:r>
+          </a:p>
+          <a:p>
             <a:endParaRPr lang="en-GB" dirty="0"/>
           </a:p>
           <a:p>
             <a:r>
-              <a:rPr lang="en-GB" b="0" dirty="0"/>
-              <a:t>Use the following questions when using ML in epidemiology:</a:t>
+              <a:rPr lang="en-US" altLang="en-US" dirty="0"/>
+              <a:t>Prediction</a:t>
+            </a:r>
+            <a:r>
+              <a:rPr lang="en-US" altLang="en-US" b="0" dirty="0"/>
+              <a:t> of outcomes with interpretability at the individual level (e.g., LIME, SHAP)</a:t>
+            </a:r>
+          </a:p>
+          <a:p>
+            <a:endParaRPr lang="en-GB" dirty="0"/>
+          </a:p>
+          <a:p>
+            <a:r>
+              <a:rPr lang="en-GB" dirty="0"/>
+              <a:t>Theory building:</a:t>
             </a:r>
           </a:p>
           <a:p>
@@ -6670,14 +7758,12 @@
               <a:buChar char="•"/>
             </a:pPr>
             <a:r>
-              <a:rPr lang="en-GB" dirty="0"/>
-              <a:t>How much better does the ML ? </a:t>
-            </a:r>
-            <a:r>
-              <a:rPr lang="en-GB" b="0" dirty="0">
-                <a:sym typeface="Wingdings" pitchFamily="2" charset="2"/>
-              </a:rPr>
-              <a:t> Use cross-validation to evaluate. Don’t use fancy methods if they are not better than simple methods.</a:t>
+              <a:rPr lang="en-GB" b="0" dirty="0"/>
+              <a:t>ML can detect higher-order interactions and other complicated </a:t>
+            </a:r>
+            <a:r>
+              <a:rPr lang="en-US" b="0" dirty="0"/>
+              <a:t>responses</a:t>
             </a:r>
           </a:p>
           <a:p>
@@ -6686,16 +7772,29 @@
               <a:buChar char="•"/>
             </a:pPr>
             <a:r>
-              <a:rPr lang="en-GB" dirty="0"/>
-              <a:t>What have we learned? </a:t>
-            </a:r>
-            <a:r>
-              <a:rPr lang="en-GB" b="0" dirty="0">
+              <a:rPr lang="en-US" b="0" dirty="0"/>
+              <a:t>Run the ML model on the full data </a:t>
+            </a:r>
+            <a:r>
+              <a:rPr lang="en-US" b="0" dirty="0">
                 <a:sym typeface="Wingdings" pitchFamily="2" charset="2"/>
               </a:rPr>
-              <a:t> Interpretability helps here</a:t>
-            </a:r>
-            <a:endParaRPr lang="en-GB" dirty="0"/>
+              <a:t> Does it increase prediction compared to the traditional model?</a:t>
+            </a:r>
+          </a:p>
+          <a:p>
+            <a:pPr marL="569214" lvl="1" indent="-285750"/>
+            <a:r>
+              <a:rPr lang="en-US" b="0" dirty="0"/>
+              <a:t>You may be missing an important variable</a:t>
+            </a:r>
+          </a:p>
+          <a:p>
+            <a:pPr marL="569214" lvl="1" indent="-285750"/>
+            <a:r>
+              <a:rPr lang="en-US" dirty="0"/>
+              <a:t>Your model may be missing interactions</a:t>
+            </a:r>
           </a:p>
           <a:p>
             <a:pPr marL="285750" indent="-285750">
@@ -6703,68 +7802,15 @@
               <a:buChar char="•"/>
             </a:pPr>
             <a:r>
-              <a:rPr lang="en-GB" dirty="0"/>
-              <a:t>Is our method able to generalize? </a:t>
-            </a:r>
-            <a:r>
-              <a:rPr lang="en-GB" dirty="0">
-                <a:sym typeface="Wingdings" pitchFamily="2" charset="2"/>
-              </a:rPr>
-              <a:t> </a:t>
-            </a:r>
-            <a:r>
-              <a:rPr lang="en-GB" b="0" dirty="0">
-                <a:sym typeface="Wingdings" pitchFamily="2" charset="2"/>
-              </a:rPr>
-              <a:t>If we use our algorithm to predict new observations, make sure it keeps predicting well (i.e., do not blindly trust it)</a:t>
-            </a:r>
-            <a:endParaRPr lang="en-GB" dirty="0"/>
-          </a:p>
-          <a:p>
-            <a:pPr marL="285750" indent="-285750">
-              <a:buFont typeface="Arial" panose="020B0604020202020204" pitchFamily="34" charset="0"/>
-              <a:buChar char="•"/>
+              <a:rPr lang="en-US" b="0" dirty="0"/>
+              <a:t>Evaluate model using interpretability tools</a:t>
+            </a:r>
+          </a:p>
+          <a:p>
+            <a:pPr lvl="1" indent="0">
+              <a:buNone/>
             </a:pPr>
-            <a:r>
-              <a:rPr lang="en-GB" dirty="0"/>
-              <a:t>Is our algorithm fair? </a:t>
-            </a:r>
-            <a:r>
-              <a:rPr lang="en-GB" dirty="0">
-                <a:sym typeface="Wingdings" pitchFamily="2" charset="2"/>
-              </a:rPr>
-              <a:t> </a:t>
-            </a:r>
-            <a:r>
-              <a:rPr lang="en-GB" dirty="0"/>
-              <a:t> </a:t>
-            </a:r>
-            <a:r>
-              <a:rPr lang="en-GB" b="0" dirty="0"/>
-              <a:t>http://</a:t>
-            </a:r>
-            <a:r>
-              <a:rPr lang="en-GB" b="0" dirty="0" err="1"/>
-              <a:t>aequitas.dssg.io</a:t>
-            </a:r>
-            <a:r>
-              <a:rPr lang="en-GB" b="0" dirty="0"/>
-              <a:t>/audit/_g5htt_b/</a:t>
-            </a:r>
-            <a:r>
-              <a:rPr lang="en-GB" b="0" dirty="0" err="1"/>
-              <a:t>compas_for_aequitas</a:t>
-            </a:r>
-            <a:r>
-              <a:rPr lang="en-GB" b="0" dirty="0"/>
-              <a:t>/</a:t>
-            </a:r>
-          </a:p>
-          <a:p>
-            <a:endParaRPr lang="en-GB" dirty="0"/>
-          </a:p>
-          <a:p>
-            <a:endParaRPr lang="en-GB" dirty="0"/>
+            <a:endParaRPr lang="en-US" dirty="0"/>
           </a:p>
         </p:txBody>
       </p:sp>
@@ -6796,9 +7842,317 @@
           <a:p>
             <a:r>
               <a:rPr lang="en-US" dirty="0"/>
+              <a:t>Some uses of ML in epidemiology</a:t>
+            </a:r>
+            <a:endParaRPr lang="en-NL" dirty="0"/>
+          </a:p>
+        </p:txBody>
+      </p:sp>
+      <p:pic>
+        <p:nvPicPr>
+          <p:cNvPr id="5" name="Picture 2">
+            <a:extLst>
+              <a:ext uri="{FF2B5EF4-FFF2-40B4-BE49-F238E27FC236}">
+                <a16:creationId xmlns:a16="http://schemas.microsoft.com/office/drawing/2014/main" id="{A8F2869D-E854-4EFF-79A6-88CA8ABD3F7E}"/>
+              </a:ext>
+            </a:extLst>
+          </p:cNvPr>
+          <p:cNvPicPr>
+            <a:picLocks noChangeAspect="1" noChangeArrowheads="1"/>
+          </p:cNvPicPr>
+          <p:nvPr/>
+        </p:nvPicPr>
+        <p:blipFill rotWithShape="1">
+          <a:blip r:embed="rId2">
+            <a:extLst>
+              <a:ext uri="{28A0092B-C50C-407E-A947-70E740481C1C}">
+                <a14:useLocalDpi xmlns:a14="http://schemas.microsoft.com/office/drawing/2010/main" val="0"/>
+              </a:ext>
+            </a:extLst>
+          </a:blip>
+          <a:srcRect l="44188"/>
+          <a:stretch/>
+        </p:blipFill>
+        <p:spPr bwMode="auto">
+          <a:xfrm>
+            <a:off x="7294767" y="4444999"/>
+            <a:ext cx="3413458" cy="2025073"/>
+          </a:xfrm>
+          <a:prstGeom prst="rect">
+            <a:avLst/>
+          </a:prstGeom>
+          <a:noFill/>
+          <a:extLst>
+            <a:ext uri="{909E8E84-426E-40DD-AFC4-6F175D3DCCD1}">
+              <a14:hiddenFill xmlns:a14="http://schemas.microsoft.com/office/drawing/2010/main">
+                <a:solidFill>
+                  <a:srgbClr val="FFFFFF"/>
+                </a:solidFill>
+              </a14:hiddenFill>
+            </a:ext>
+          </a:extLst>
+        </p:spPr>
+      </p:pic>
+    </p:spTree>
+    <p:extLst>
+      <p:ext uri="{BB962C8B-B14F-4D97-AF65-F5344CB8AC3E}">
+        <p14:creationId xmlns:p14="http://schemas.microsoft.com/office/powerpoint/2010/main" val="3928546922"/>
+      </p:ext>
+    </p:extLst>
+  </p:cSld>
+  <p:clrMapOvr>
+    <a:masterClrMapping/>
+  </p:clrMapOvr>
+</p:sld>
+</file>
+
+<file path=ppt/slides/slide23.xml><?xml version="1.0" encoding="utf-8"?>
+<p:sld xmlns:a="http://schemas.openxmlformats.org/drawingml/2006/main" xmlns:r="http://schemas.openxmlformats.org/officeDocument/2006/relationships" xmlns:p="http://schemas.openxmlformats.org/presentationml/2006/main">
+  <p:cSld>
+    <p:spTree>
+      <p:nvGrpSpPr>
+        <p:cNvPr id="1" name=""/>
+        <p:cNvGrpSpPr/>
+        <p:nvPr/>
+      </p:nvGrpSpPr>
+      <p:grpSpPr>
+        <a:xfrm>
+          <a:off x="0" y="0"/>
+          <a:ext cx="0" cy="0"/>
+          <a:chOff x="0" y="0"/>
+          <a:chExt cx="0" cy="0"/>
+        </a:xfrm>
+      </p:grpSpPr>
+      <p:sp>
+        <p:nvSpPr>
+          <p:cNvPr id="2" name="Text Placeholder 1">
+            <a:extLst>
+              <a:ext uri="{FF2B5EF4-FFF2-40B4-BE49-F238E27FC236}">
+                <a16:creationId xmlns:a16="http://schemas.microsoft.com/office/drawing/2014/main" id="{AB1C5EA4-9F16-8E9D-39EA-FD3EC5434C4C}"/>
+              </a:ext>
+            </a:extLst>
+          </p:cNvPr>
+          <p:cNvSpPr>
+            <a:spLocks noGrp="1"/>
+          </p:cNvSpPr>
+          <p:nvPr>
+            <p:ph type="body" sz="quarter" idx="11"/>
+          </p:nvPr>
+        </p:nvSpPr>
+        <p:spPr>
+          <a:xfrm>
+            <a:off x="762000" y="1498600"/>
+            <a:ext cx="9982201" cy="3670300"/>
+          </a:xfrm>
+        </p:spPr>
+        <p:txBody>
+          <a:bodyPr>
+            <a:normAutofit/>
+          </a:bodyPr>
+          <a:lstStyle/>
+          <a:p>
+            <a:endParaRPr lang="en-GB" dirty="0"/>
+          </a:p>
+          <a:p>
+            <a:r>
+              <a:rPr lang="en-GB" b="0" dirty="0"/>
+              <a:t>Use the following questions when using ML in epidemiology:</a:t>
+            </a:r>
+          </a:p>
+          <a:p>
+            <a:pPr marL="285750" indent="-285750">
+              <a:buFont typeface="Arial" panose="020B0604020202020204" pitchFamily="34" charset="0"/>
+              <a:buChar char="•"/>
+            </a:pPr>
+            <a:r>
+              <a:rPr lang="en-GB" dirty="0"/>
+              <a:t>How much better is the fancy model? </a:t>
+            </a:r>
+            <a:r>
+              <a:rPr lang="en-GB" b="0" dirty="0">
+                <a:sym typeface="Wingdings" pitchFamily="2" charset="2"/>
+              </a:rPr>
+              <a:t> Use cross-validation to evaluate. Don’t use complicated methods if they are not better than simple methods.</a:t>
+            </a:r>
+          </a:p>
+          <a:p>
+            <a:pPr marL="285750" indent="-285750">
+              <a:buFont typeface="Arial" panose="020B0604020202020204" pitchFamily="34" charset="0"/>
+              <a:buChar char="•"/>
+            </a:pPr>
+            <a:r>
+              <a:rPr lang="en-GB" dirty="0"/>
+              <a:t>What can we learn about the world from the model? </a:t>
+            </a:r>
+            <a:r>
+              <a:rPr lang="en-GB" b="0" dirty="0">
+                <a:sym typeface="Wingdings" pitchFamily="2" charset="2"/>
+              </a:rPr>
+              <a:t> Interpretability helps here</a:t>
+            </a:r>
+            <a:endParaRPr lang="en-GB" dirty="0"/>
+          </a:p>
+          <a:p>
+            <a:pPr marL="285750" indent="-285750">
+              <a:buFont typeface="Arial" panose="020B0604020202020204" pitchFamily="34" charset="0"/>
+              <a:buChar char="•"/>
+            </a:pPr>
+            <a:r>
+              <a:rPr lang="en-GB" dirty="0"/>
+              <a:t>Is our method able to generalize? </a:t>
+            </a:r>
+            <a:r>
+              <a:rPr lang="en-GB" dirty="0">
+                <a:sym typeface="Wingdings" pitchFamily="2" charset="2"/>
+              </a:rPr>
+              <a:t> </a:t>
+            </a:r>
+            <a:r>
+              <a:rPr lang="en-GB" b="0" dirty="0">
+                <a:sym typeface="Wingdings" pitchFamily="2" charset="2"/>
+              </a:rPr>
+              <a:t>If we use our algorithm to predict new observations, make sure it keeps predicting well (i.e., do not blindly trust it)</a:t>
+            </a:r>
+            <a:endParaRPr lang="en-GB" dirty="0"/>
+          </a:p>
+          <a:p>
+            <a:pPr marL="285750" indent="-285750">
+              <a:buFont typeface="Arial" panose="020B0604020202020204" pitchFamily="34" charset="0"/>
+              <a:buChar char="•"/>
+            </a:pPr>
+            <a:r>
+              <a:rPr lang="en-GB" dirty="0"/>
+              <a:t>Is our algorithm fair? </a:t>
+            </a:r>
+            <a:r>
+              <a:rPr lang="en-GB" dirty="0">
+                <a:sym typeface="Wingdings" pitchFamily="2" charset="2"/>
+              </a:rPr>
+              <a:t> </a:t>
+            </a:r>
+            <a:r>
+              <a:rPr lang="en-GB" dirty="0"/>
+              <a:t> </a:t>
+            </a:r>
+            <a:r>
+              <a:rPr lang="en-GB" b="0" dirty="0"/>
+              <a:t>http://</a:t>
+            </a:r>
+            <a:r>
+              <a:rPr lang="en-GB" b="0" dirty="0" err="1"/>
+              <a:t>aequitas.dssg.io</a:t>
+            </a:r>
+            <a:r>
+              <a:rPr lang="en-GB" b="0" dirty="0"/>
+              <a:t>/audit/_g5htt_b/</a:t>
+            </a:r>
+            <a:r>
+              <a:rPr lang="en-GB" b="0" dirty="0" err="1"/>
+              <a:t>compas_for_aequitas</a:t>
+            </a:r>
+            <a:r>
+              <a:rPr lang="en-GB" b="0" dirty="0"/>
+              <a:t>/</a:t>
+            </a:r>
+          </a:p>
+          <a:p>
+            <a:endParaRPr lang="en-GB" dirty="0"/>
+          </a:p>
+          <a:p>
+            <a:endParaRPr lang="en-GB" dirty="0"/>
+          </a:p>
+        </p:txBody>
+      </p:sp>
+      <p:sp>
+        <p:nvSpPr>
+          <p:cNvPr id="4" name="Title 3">
+            <a:extLst>
+              <a:ext uri="{FF2B5EF4-FFF2-40B4-BE49-F238E27FC236}">
+                <a16:creationId xmlns:a16="http://schemas.microsoft.com/office/drawing/2014/main" id="{1DA1E466-424B-F32A-8DAD-C46B62ADE7BE}"/>
+              </a:ext>
+            </a:extLst>
+          </p:cNvPr>
+          <p:cNvSpPr>
+            <a:spLocks noGrp="1"/>
+          </p:cNvSpPr>
+          <p:nvPr>
+            <p:ph type="title"/>
+          </p:nvPr>
+        </p:nvSpPr>
+        <p:spPr>
+          <a:xfrm>
+            <a:off x="762000" y="715961"/>
+            <a:ext cx="8239496" cy="1189038"/>
+          </a:xfrm>
+        </p:spPr>
+        <p:txBody>
+          <a:bodyPr/>
+          <a:lstStyle/>
+          <a:p>
+            <a:r>
+              <a:rPr lang="en-US" dirty="0"/>
               <a:t>Final remarks</a:t>
             </a:r>
             <a:endParaRPr lang="en-NL" dirty="0"/>
+          </a:p>
+        </p:txBody>
+      </p:sp>
+      <p:sp>
+        <p:nvSpPr>
+          <p:cNvPr id="5" name="Title 3">
+            <a:extLst>
+              <a:ext uri="{FF2B5EF4-FFF2-40B4-BE49-F238E27FC236}">
+                <a16:creationId xmlns:a16="http://schemas.microsoft.com/office/drawing/2014/main" id="{38929115-0EE2-CEE5-8302-96A03BB101E8}"/>
+              </a:ext>
+            </a:extLst>
+          </p:cNvPr>
+          <p:cNvSpPr txBox="1">
+            <a:spLocks/>
+          </p:cNvSpPr>
+          <p:nvPr/>
+        </p:nvSpPr>
+        <p:spPr>
+          <a:xfrm>
+            <a:off x="762000" y="5168900"/>
+            <a:ext cx="8239496" cy="1189038"/>
+          </a:xfrm>
+          <a:prstGeom prst="rect">
+            <a:avLst/>
+          </a:prstGeom>
+        </p:spPr>
+        <p:txBody>
+          <a:bodyPr vert="horz" lIns="91440" tIns="45720" rIns="91440" bIns="45720" rtlCol="0" anchor="t">
+            <a:normAutofit/>
+          </a:bodyPr>
+          <a:lstStyle>
+            <a:lvl1pPr algn="l" defTabSz="914400" rtl="0" eaLnBrk="1" latinLnBrk="0" hangingPunct="1">
+              <a:lnSpc>
+                <a:spcPct val="90000"/>
+              </a:lnSpc>
+              <a:spcBef>
+                <a:spcPct val="0"/>
+              </a:spcBef>
+              <a:buNone/>
+              <a:defRPr lang="en-US" sz="4000" b="1" kern="1200">
+                <a:solidFill>
+                  <a:schemeClr val="accent3"/>
+                </a:solidFill>
+                <a:latin typeface="+mj-lt"/>
+                <a:ea typeface="+mn-ea"/>
+                <a:cs typeface="+mn-cs"/>
+              </a:defRPr>
+            </a:lvl1pPr>
+          </a:lstStyle>
+          <a:p>
+            <a:pPr fontAlgn="auto">
+              <a:spcAft>
+                <a:spcPts val="0"/>
+              </a:spcAft>
+            </a:pPr>
+            <a:r>
+              <a:rPr lang="en-GB" sz="2000" dirty="0"/>
+              <a:t>Thanks!</a:t>
+            </a:r>
           </a:p>
         </p:txBody>
       </p:sp>
@@ -6812,6 +8166,84 @@
   <p:clrMapOvr>
     <a:masterClrMapping/>
   </p:clrMapOvr>
+  <p:timing>
+    <p:tnLst>
+      <p:par>
+        <p:cTn id="1" dur="indefinite" restart="never" nodeType="tmRoot">
+          <p:childTnLst>
+            <p:seq concurrent="1" nextAc="seek">
+              <p:cTn id="2" dur="indefinite" nodeType="mainSeq">
+                <p:childTnLst>
+                  <p:par>
+                    <p:cTn id="3" fill="hold">
+                      <p:stCondLst>
+                        <p:cond delay="indefinite"/>
+                      </p:stCondLst>
+                      <p:childTnLst>
+                        <p:par>
+                          <p:cTn id="4" fill="hold">
+                            <p:stCondLst>
+                              <p:cond delay="0"/>
+                            </p:stCondLst>
+                            <p:childTnLst>
+                              <p:par>
+                                <p:cTn id="5" presetID="1" presetClass="entr" presetSubtype="0" fill="hold" grpId="0" nodeType="clickEffect">
+                                  <p:stCondLst>
+                                    <p:cond delay="0"/>
+                                  </p:stCondLst>
+                                  <p:childTnLst>
+                                    <p:set>
+                                      <p:cBhvr>
+                                        <p:cTn id="6" dur="1" fill="hold">
+                                          <p:stCondLst>
+                                            <p:cond delay="0"/>
+                                          </p:stCondLst>
+                                        </p:cTn>
+                                        <p:tgtEl>
+                                          <p:spTgt spid="5"/>
+                                        </p:tgtEl>
+                                        <p:attrNameLst>
+                                          <p:attrName>style.visibility</p:attrName>
+                                        </p:attrNameLst>
+                                      </p:cBhvr>
+                                      <p:to>
+                                        <p:strVal val="visible"/>
+                                      </p:to>
+                                    </p:set>
+                                  </p:childTnLst>
+                                </p:cTn>
+                              </p:par>
+                            </p:childTnLst>
+                          </p:cTn>
+                        </p:par>
+                      </p:childTnLst>
+                    </p:cTn>
+                  </p:par>
+                </p:childTnLst>
+              </p:cTn>
+              <p:prevCondLst>
+                <p:cond evt="onPrev" delay="0">
+                  <p:tgtEl>
+                    <p:sldTgt/>
+                  </p:tgtEl>
+                </p:cond>
+              </p:prevCondLst>
+              <p:nextCondLst>
+                <p:cond evt="onNext" delay="0">
+                  <p:tgtEl>
+                    <p:sldTgt/>
+                  </p:tgtEl>
+                </p:cond>
+              </p:nextCondLst>
+            </p:seq>
+          </p:childTnLst>
+        </p:cTn>
+      </p:par>
+    </p:tnLst>
+    <p:bldLst>
+      <p:bldP spid="5" grpId="0"/>
+    </p:bldLst>
+  </p:timing>
 </p:sld>
 </file>
 
@@ -6866,7 +8298,7 @@
             </a:r>
             <a:r>
               <a:rPr lang="en-GB" b="0" dirty="0"/>
-              <a:t>Provide labels. Performance = discrepancy between predicted labels and real labels</a:t>
+              <a:t>Output is available. Performance = discrepancy between predicted output and real output</a:t>
             </a:r>
             <a:endParaRPr lang="en-GB" dirty="0"/>
           </a:p>
@@ -6903,7 +8335,7 @@
             </a:r>
             <a:r>
               <a:rPr lang="en-GB" b="0" dirty="0"/>
-              <a:t>No labels. Performance = reduction of some error </a:t>
+              <a:t>No labels/output. Performance = reduction of some error </a:t>
             </a:r>
           </a:p>
           <a:p>
@@ -6923,7 +8355,7 @@
             </a:pPr>
             <a:r>
               <a:rPr lang="en-GB" b="0" dirty="0"/>
-              <a:t>Dimensionality reduction (e.g. combine variables to maximize the amount of variability contained)</a:t>
+              <a:t>Dimensionality reduction (e.g. combine variables to maximize the amount of variability explained)</a:t>
             </a:r>
           </a:p>
           <a:p>
@@ -7246,141 +8678,6 @@
           </a:p>
         </p:txBody>
       </p:sp>
-      <p:pic>
-        <p:nvPicPr>
-          <p:cNvPr id="15362" name="Picture 2" descr="Both random forest and GBDT build a model consisting of multiple decision trees.">
-            <a:extLst>
-              <a:ext uri="{FF2B5EF4-FFF2-40B4-BE49-F238E27FC236}">
-                <a16:creationId xmlns:a16="http://schemas.microsoft.com/office/drawing/2014/main" id="{D6DD5F55-D5F8-4B24-C030-6E13645737C4}"/>
-              </a:ext>
-            </a:extLst>
-          </p:cNvPr>
-          <p:cNvPicPr>
-            <a:picLocks noChangeAspect="1" noChangeArrowheads="1"/>
-          </p:cNvPicPr>
-          <p:nvPr/>
-        </p:nvPicPr>
-        <p:blipFill>
-          <a:blip r:embed="rId2">
-            <a:extLst>
-              <a:ext uri="{28A0092B-C50C-407E-A947-70E740481C1C}">
-                <a14:useLocalDpi xmlns:a14="http://schemas.microsoft.com/office/drawing/2010/main" val="0"/>
-              </a:ext>
-            </a:extLst>
-          </a:blip>
-          <a:srcRect/>
-          <a:stretch>
-            <a:fillRect/>
-          </a:stretch>
-        </p:blipFill>
-        <p:spPr bwMode="auto">
-          <a:xfrm>
-            <a:off x="4140199" y="4233015"/>
-            <a:ext cx="2997199" cy="1878245"/>
-          </a:xfrm>
-          <a:prstGeom prst="rect">
-            <a:avLst/>
-          </a:prstGeom>
-          <a:noFill/>
-          <a:extLst>
-            <a:ext uri="{909E8E84-426E-40DD-AFC4-6F175D3DCCD1}">
-              <a14:hiddenFill xmlns:a14="http://schemas.microsoft.com/office/drawing/2010/main">
-                <a:solidFill>
-                  <a:srgbClr val="FFFFFF"/>
-                </a:solidFill>
-              </a14:hiddenFill>
-            </a:ext>
-          </a:extLst>
-        </p:spPr>
-      </p:pic>
-      <p:pic>
-        <p:nvPicPr>
-          <p:cNvPr id="15364" name="Picture 4" descr="Flow chart of XGBoost.">
-            <a:extLst>
-              <a:ext uri="{FF2B5EF4-FFF2-40B4-BE49-F238E27FC236}">
-                <a16:creationId xmlns:a16="http://schemas.microsoft.com/office/drawing/2014/main" id="{F56CE601-0424-C903-208E-B5681CAA408F}"/>
-              </a:ext>
-            </a:extLst>
-          </p:cNvPr>
-          <p:cNvPicPr>
-            <a:picLocks noChangeAspect="1" noChangeArrowheads="1"/>
-          </p:cNvPicPr>
-          <p:nvPr/>
-        </p:nvPicPr>
-        <p:blipFill>
-          <a:blip r:embed="rId3">
-            <a:extLst>
-              <a:ext uri="{28A0092B-C50C-407E-A947-70E740481C1C}">
-                <a14:useLocalDpi xmlns:a14="http://schemas.microsoft.com/office/drawing/2010/main" val="0"/>
-              </a:ext>
-            </a:extLst>
-          </a:blip>
-          <a:srcRect/>
-          <a:stretch>
-            <a:fillRect/>
-          </a:stretch>
-        </p:blipFill>
-        <p:spPr bwMode="auto">
-          <a:xfrm>
-            <a:off x="7571556" y="3481843"/>
-            <a:ext cx="4146574" cy="2629416"/>
-          </a:xfrm>
-          <a:prstGeom prst="rect">
-            <a:avLst/>
-          </a:prstGeom>
-          <a:noFill/>
-          <a:extLst>
-            <a:ext uri="{909E8E84-426E-40DD-AFC4-6F175D3DCCD1}">
-              <a14:hiddenFill xmlns:a14="http://schemas.microsoft.com/office/drawing/2010/main">
-                <a:solidFill>
-                  <a:srgbClr val="FFFFFF"/>
-                </a:solidFill>
-              </a14:hiddenFill>
-            </a:ext>
-          </a:extLst>
-        </p:spPr>
-      </p:pic>
-      <p:sp>
-        <p:nvSpPr>
-          <p:cNvPr id="3" name="TextBox 2">
-            <a:extLst>
-              <a:ext uri="{FF2B5EF4-FFF2-40B4-BE49-F238E27FC236}">
-                <a16:creationId xmlns:a16="http://schemas.microsoft.com/office/drawing/2014/main" id="{90AA7683-02D6-81C3-01B5-CBE1CF9301CD}"/>
-              </a:ext>
-            </a:extLst>
-          </p:cNvPr>
-          <p:cNvSpPr txBox="1"/>
-          <p:nvPr/>
-        </p:nvSpPr>
-        <p:spPr>
-          <a:xfrm>
-            <a:off x="7571556" y="6111259"/>
-            <a:ext cx="1407758" cy="307777"/>
-          </a:xfrm>
-          <a:prstGeom prst="rect">
-            <a:avLst/>
-          </a:prstGeom>
-          <a:noFill/>
-        </p:spPr>
-        <p:txBody>
-          <a:bodyPr wrap="none" rtlCol="0">
-            <a:spAutoFit/>
-          </a:bodyPr>
-          <a:lstStyle/>
-          <a:p>
-            <a:r>
-              <a:rPr lang="en-NL" sz="1400" dirty="0">
-                <a:solidFill>
-                  <a:schemeClr val="bg1">
-                    <a:lumMod val="50000"/>
-                  </a:schemeClr>
-                </a:solidFill>
-              </a:rPr>
-              <a:t>Guo et al, 2020</a:t>
-            </a:r>
-          </a:p>
-        </p:txBody>
-      </p:sp>
       <p:sp>
         <p:nvSpPr>
           <p:cNvPr id="6" name="Text Placeholder 5">
@@ -7429,256 +8726,504 @@
               <a:sym typeface="Wingdings" pitchFamily="2" charset="2"/>
             </a:endParaRPr>
           </a:p>
-          <a:p>
-            <a:r>
-              <a:rPr lang="en-GB" b="0" dirty="0"/>
-              <a:t>Boosting: Incrementally build trees to fix observations previously miscategorized</a:t>
-            </a:r>
-            <a:endParaRPr lang="en-NL" b="0" dirty="0"/>
-          </a:p>
         </p:txBody>
       </p:sp>
-      <p:sp>
-        <p:nvSpPr>
-          <p:cNvPr id="7" name="TextBox 6">
-            <a:extLst>
-              <a:ext uri="{FF2B5EF4-FFF2-40B4-BE49-F238E27FC236}">
-                <a16:creationId xmlns:a16="http://schemas.microsoft.com/office/drawing/2014/main" id="{CD4140B7-1C81-F5DB-185A-829FC6A7231A}"/>
-              </a:ext>
-            </a:extLst>
-          </p:cNvPr>
-          <p:cNvSpPr txBox="1"/>
+      <p:grpSp>
+        <p:nvGrpSpPr>
+          <p:cNvPr id="4" name="Group 3">
+            <a:extLst>
+              <a:ext uri="{FF2B5EF4-FFF2-40B4-BE49-F238E27FC236}">
+                <a16:creationId xmlns:a16="http://schemas.microsoft.com/office/drawing/2014/main" id="{A859C77C-C5FD-7737-6645-5F943D20CE95}"/>
+              </a:ext>
+            </a:extLst>
+          </p:cNvPr>
+          <p:cNvGrpSpPr/>
           <p:nvPr/>
-        </p:nvSpPr>
-        <p:spPr>
-          <a:xfrm>
-            <a:off x="4140200" y="6111260"/>
-            <a:ext cx="784189" cy="307777"/>
-          </a:xfrm>
-          <a:prstGeom prst="rect">
-            <a:avLst/>
-          </a:prstGeom>
-          <a:noFill/>
-        </p:spPr>
-        <p:txBody>
-          <a:bodyPr wrap="none" rtlCol="0">
-            <a:spAutoFit/>
-          </a:bodyPr>
-          <a:lstStyle/>
-          <a:p>
-            <a:r>
-              <a:rPr lang="en-NL" sz="1400" dirty="0">
+        </p:nvGrpSpPr>
+        <p:grpSpPr>
+          <a:xfrm>
+            <a:off x="694906" y="3873674"/>
+            <a:ext cx="3064294" cy="2545364"/>
+            <a:chOff x="694906" y="3873674"/>
+            <a:chExt cx="3064294" cy="2545364"/>
+          </a:xfrm>
+        </p:grpSpPr>
+        <p:pic>
+          <p:nvPicPr>
+            <p:cNvPr id="15366" name="Picture 6" descr="Decision Trees modified">
+              <a:extLst>
+                <a:ext uri="{FF2B5EF4-FFF2-40B4-BE49-F238E27FC236}">
+                  <a16:creationId xmlns:a16="http://schemas.microsoft.com/office/drawing/2014/main" id="{2DC5FAB4-677C-73DD-2B39-B088517617E1}"/>
+                </a:ext>
+              </a:extLst>
+            </p:cNvPr>
+            <p:cNvPicPr>
+              <a:picLocks noChangeAspect="1" noChangeArrowheads="1"/>
+            </p:cNvPicPr>
+            <p:nvPr/>
+          </p:nvPicPr>
+          <p:blipFill>
+            <a:blip r:embed="rId2">
+              <a:extLst>
+                <a:ext uri="{28A0092B-C50C-407E-A947-70E740481C1C}">
+                  <a14:useLocalDpi xmlns:a14="http://schemas.microsoft.com/office/drawing/2010/main" val="0"/>
+                </a:ext>
+              </a:extLst>
+            </a:blip>
+            <a:srcRect/>
+            <a:stretch>
+              <a:fillRect/>
+            </a:stretch>
+          </p:blipFill>
+          <p:spPr bwMode="auto">
+            <a:xfrm>
+              <a:off x="762000" y="4243006"/>
+              <a:ext cx="2997200" cy="1868255"/>
+            </a:xfrm>
+            <a:prstGeom prst="rect">
+              <a:avLst/>
+            </a:prstGeom>
+            <a:noFill/>
+            <a:extLst>
+              <a:ext uri="{909E8E84-426E-40DD-AFC4-6F175D3DCCD1}">
+                <a14:hiddenFill xmlns:a14="http://schemas.microsoft.com/office/drawing/2010/main">
+                  <a:solidFill>
+                    <a:srgbClr val="FFFFFF"/>
+                  </a:solidFill>
+                </a14:hiddenFill>
+              </a:ext>
+            </a:extLst>
+          </p:spPr>
+        </p:pic>
+        <p:sp>
+          <p:nvSpPr>
+            <p:cNvPr id="13" name="TextBox 12">
+              <a:extLst>
+                <a:ext uri="{FF2B5EF4-FFF2-40B4-BE49-F238E27FC236}">
+                  <a16:creationId xmlns:a16="http://schemas.microsoft.com/office/drawing/2014/main" id="{9C5A7B9E-D5D0-29C2-4B95-AB282D4DBE76}"/>
+                </a:ext>
+              </a:extLst>
+            </p:cNvPr>
+            <p:cNvSpPr txBox="1"/>
+            <p:nvPr/>
+          </p:nvSpPr>
+          <p:spPr>
+            <a:xfrm>
+              <a:off x="694906" y="6111261"/>
+              <a:ext cx="1140056" cy="307777"/>
+            </a:xfrm>
+            <a:prstGeom prst="rect">
+              <a:avLst/>
+            </a:prstGeom>
+            <a:noFill/>
+          </p:spPr>
+          <p:txBody>
+            <a:bodyPr wrap="none" rtlCol="0">
+              <a:spAutoFit/>
+            </a:bodyPr>
+            <a:lstStyle/>
+            <a:p>
+              <a:r>
+                <a:rPr lang="en-NL" sz="1400" dirty="0">
+                  <a:solidFill>
+                    <a:schemeClr val="bg1">
+                      <a:lumMod val="50000"/>
+                    </a:schemeClr>
+                  </a:solidFill>
+                </a:rPr>
+                <a:t>Xoriant.com</a:t>
+              </a:r>
+            </a:p>
+          </p:txBody>
+        </p:sp>
+        <p:sp>
+          <p:nvSpPr>
+            <p:cNvPr id="9" name="TextBox 8">
+              <a:extLst>
+                <a:ext uri="{FF2B5EF4-FFF2-40B4-BE49-F238E27FC236}">
+                  <a16:creationId xmlns:a16="http://schemas.microsoft.com/office/drawing/2014/main" id="{6F18B281-9609-E788-CCEC-44DD75998D3B}"/>
+                </a:ext>
+              </a:extLst>
+            </p:cNvPr>
+            <p:cNvSpPr txBox="1"/>
+            <p:nvPr/>
+          </p:nvSpPr>
+          <p:spPr>
+            <a:xfrm>
+              <a:off x="694906" y="3873674"/>
+              <a:ext cx="1531188" cy="369332"/>
+            </a:xfrm>
+            <a:prstGeom prst="rect">
+              <a:avLst/>
+            </a:prstGeom>
+            <a:noFill/>
+          </p:spPr>
+          <p:txBody>
+            <a:bodyPr wrap="none" rtlCol="0">
+              <a:spAutoFit/>
+            </a:bodyPr>
+            <a:lstStyle/>
+            <a:p>
+              <a:r>
+                <a:rPr lang="en-NL" dirty="0"/>
+                <a:t>Decision tree</a:t>
+              </a:r>
+            </a:p>
+          </p:txBody>
+        </p:sp>
+      </p:grpSp>
+      <p:grpSp>
+        <p:nvGrpSpPr>
+          <p:cNvPr id="2" name="Group 1">
+            <a:extLst>
+              <a:ext uri="{FF2B5EF4-FFF2-40B4-BE49-F238E27FC236}">
+                <a16:creationId xmlns:a16="http://schemas.microsoft.com/office/drawing/2014/main" id="{445AFFDF-679B-0BF5-5FA5-5E1591B0E290}"/>
+              </a:ext>
+            </a:extLst>
+          </p:cNvPr>
+          <p:cNvGrpSpPr/>
+          <p:nvPr/>
+        </p:nvGrpSpPr>
+        <p:grpSpPr>
+          <a:xfrm>
+            <a:off x="4069512" y="3852998"/>
+            <a:ext cx="3300904" cy="2566039"/>
+            <a:chOff x="4069512" y="3852998"/>
+            <a:chExt cx="3300904" cy="2566039"/>
+          </a:xfrm>
+        </p:grpSpPr>
+        <p:pic>
+          <p:nvPicPr>
+            <p:cNvPr id="15362" name="Picture 2" descr="Both random forest and GBDT build a model consisting of multiple decision trees.">
+              <a:extLst>
+                <a:ext uri="{FF2B5EF4-FFF2-40B4-BE49-F238E27FC236}">
+                  <a16:creationId xmlns:a16="http://schemas.microsoft.com/office/drawing/2014/main" id="{D6DD5F55-D5F8-4B24-C030-6E13645737C4}"/>
+                </a:ext>
+              </a:extLst>
+            </p:cNvPr>
+            <p:cNvPicPr>
+              <a:picLocks noChangeAspect="1" noChangeArrowheads="1"/>
+            </p:cNvPicPr>
+            <p:nvPr/>
+          </p:nvPicPr>
+          <p:blipFill>
+            <a:blip r:embed="rId3">
+              <a:extLst>
+                <a:ext uri="{28A0092B-C50C-407E-A947-70E740481C1C}">
+                  <a14:useLocalDpi xmlns:a14="http://schemas.microsoft.com/office/drawing/2010/main" val="0"/>
+                </a:ext>
+              </a:extLst>
+            </a:blip>
+            <a:srcRect/>
+            <a:stretch>
+              <a:fillRect/>
+            </a:stretch>
+          </p:blipFill>
+          <p:spPr bwMode="auto">
+            <a:xfrm>
+              <a:off x="4140199" y="4233015"/>
+              <a:ext cx="2997199" cy="1878245"/>
+            </a:xfrm>
+            <a:prstGeom prst="rect">
+              <a:avLst/>
+            </a:prstGeom>
+            <a:noFill/>
+            <a:extLst>
+              <a:ext uri="{909E8E84-426E-40DD-AFC4-6F175D3DCCD1}">
+                <a14:hiddenFill xmlns:a14="http://schemas.microsoft.com/office/drawing/2010/main">
+                  <a:solidFill>
+                    <a:srgbClr val="FFFFFF"/>
+                  </a:solidFill>
+                </a14:hiddenFill>
+              </a:ext>
+            </a:extLst>
+          </p:spPr>
+        </p:pic>
+        <p:sp>
+          <p:nvSpPr>
+            <p:cNvPr id="7" name="TextBox 6">
+              <a:extLst>
+                <a:ext uri="{FF2B5EF4-FFF2-40B4-BE49-F238E27FC236}">
+                  <a16:creationId xmlns:a16="http://schemas.microsoft.com/office/drawing/2014/main" id="{CD4140B7-1C81-F5DB-185A-829FC6A7231A}"/>
+                </a:ext>
+              </a:extLst>
+            </p:cNvPr>
+            <p:cNvSpPr txBox="1"/>
+            <p:nvPr/>
+          </p:nvSpPr>
+          <p:spPr>
+            <a:xfrm>
+              <a:off x="4140200" y="6111260"/>
+              <a:ext cx="784189" cy="307777"/>
+            </a:xfrm>
+            <a:prstGeom prst="rect">
+              <a:avLst/>
+            </a:prstGeom>
+            <a:noFill/>
+          </p:spPr>
+          <p:txBody>
+            <a:bodyPr wrap="none" rtlCol="0">
+              <a:spAutoFit/>
+            </a:bodyPr>
+            <a:lstStyle/>
+            <a:p>
+              <a:r>
+                <a:rPr lang="en-NL" sz="1400" dirty="0">
+                  <a:solidFill>
+                    <a:schemeClr val="bg1">
+                      <a:lumMod val="50000"/>
+                    </a:schemeClr>
+                  </a:solidFill>
+                </a:rPr>
+                <a:t>NVIDIA</a:t>
+              </a:r>
+              <a:endParaRPr lang="en-NL" dirty="0">
                 <a:solidFill>
                   <a:schemeClr val="bg1">
                     <a:lumMod val="50000"/>
                   </a:schemeClr>
                 </a:solidFill>
-              </a:rPr>
-              <a:t>NVIDIA</a:t>
-            </a:r>
-            <a:endParaRPr lang="en-NL" dirty="0">
-              <a:solidFill>
-                <a:schemeClr val="bg1">
-                  <a:lumMod val="50000"/>
-                </a:schemeClr>
-              </a:solidFill>
-            </a:endParaRPr>
-          </a:p>
-        </p:txBody>
-      </p:sp>
-      <p:pic>
-        <p:nvPicPr>
-          <p:cNvPr id="15366" name="Picture 6" descr="Decision Trees modified">
-            <a:extLst>
-              <a:ext uri="{FF2B5EF4-FFF2-40B4-BE49-F238E27FC236}">
-                <a16:creationId xmlns:a16="http://schemas.microsoft.com/office/drawing/2014/main" id="{2DC5FAB4-677C-73DD-2B39-B088517617E1}"/>
-              </a:ext>
-            </a:extLst>
-          </p:cNvPr>
-          <p:cNvPicPr>
-            <a:picLocks noChangeAspect="1" noChangeArrowheads="1"/>
-          </p:cNvPicPr>
+              </a:endParaRPr>
+            </a:p>
+          </p:txBody>
+        </p:sp>
+        <p:sp>
+          <p:nvSpPr>
+            <p:cNvPr id="15" name="TextBox 14">
+              <a:extLst>
+                <a:ext uri="{FF2B5EF4-FFF2-40B4-BE49-F238E27FC236}">
+                  <a16:creationId xmlns:a16="http://schemas.microsoft.com/office/drawing/2014/main" id="{6975F0F8-6D66-0EB1-64B9-9A7BB4F4C4FA}"/>
+                </a:ext>
+              </a:extLst>
+            </p:cNvPr>
+            <p:cNvSpPr txBox="1"/>
+            <p:nvPr/>
+          </p:nvSpPr>
+          <p:spPr>
+            <a:xfrm>
+              <a:off x="4069512" y="3852998"/>
+              <a:ext cx="3300904" cy="369332"/>
+            </a:xfrm>
+            <a:prstGeom prst="rect">
+              <a:avLst/>
+            </a:prstGeom>
+            <a:noFill/>
+          </p:spPr>
+          <p:txBody>
+            <a:bodyPr wrap="none" rtlCol="0">
+              <a:spAutoFit/>
+            </a:bodyPr>
+            <a:lstStyle/>
+            <a:p>
+              <a:r>
+                <a:rPr lang="en-NL" dirty="0"/>
+                <a:t>Ensemble (e.g. random forest)</a:t>
+              </a:r>
+            </a:p>
+          </p:txBody>
+        </p:sp>
+      </p:grpSp>
+      <p:grpSp>
+        <p:nvGrpSpPr>
+          <p:cNvPr id="11" name="Group 10">
+            <a:extLst>
+              <a:ext uri="{FF2B5EF4-FFF2-40B4-BE49-F238E27FC236}">
+                <a16:creationId xmlns:a16="http://schemas.microsoft.com/office/drawing/2014/main" id="{762A4CB7-CE5D-A80D-3EF6-F5CF03D8EAA2}"/>
+              </a:ext>
+            </a:extLst>
+          </p:cNvPr>
+          <p:cNvGrpSpPr/>
           <p:nvPr/>
-        </p:nvPicPr>
-        <p:blipFill>
-          <a:blip r:embed="rId4">
-            <a:extLst>
-              <a:ext uri="{28A0092B-C50C-407E-A947-70E740481C1C}">
-                <a14:useLocalDpi xmlns:a14="http://schemas.microsoft.com/office/drawing/2010/main" val="0"/>
-              </a:ext>
-            </a:extLst>
-          </a:blip>
-          <a:srcRect/>
-          <a:stretch>
-            <a:fillRect/>
-          </a:stretch>
-        </p:blipFill>
-        <p:spPr bwMode="auto">
-          <a:xfrm>
-            <a:off x="762000" y="4243006"/>
-            <a:ext cx="2997200" cy="1868255"/>
-          </a:xfrm>
-          <a:prstGeom prst="rect">
-            <a:avLst/>
-          </a:prstGeom>
-          <a:noFill/>
-          <a:extLst>
-            <a:ext uri="{909E8E84-426E-40DD-AFC4-6F175D3DCCD1}">
-              <a14:hiddenFill xmlns:a14="http://schemas.microsoft.com/office/drawing/2010/main">
-                <a:solidFill>
-                  <a:srgbClr val="FFFFFF"/>
-                </a:solidFill>
-              </a14:hiddenFill>
-            </a:ext>
-          </a:extLst>
-        </p:spPr>
-      </p:pic>
-      <p:sp>
-        <p:nvSpPr>
-          <p:cNvPr id="13" name="TextBox 12">
-            <a:extLst>
-              <a:ext uri="{FF2B5EF4-FFF2-40B4-BE49-F238E27FC236}">
-                <a16:creationId xmlns:a16="http://schemas.microsoft.com/office/drawing/2014/main" id="{9C5A7B9E-D5D0-29C2-4B95-AB282D4DBE76}"/>
-              </a:ext>
-            </a:extLst>
-          </p:cNvPr>
-          <p:cNvSpPr txBox="1"/>
-          <p:nvPr/>
-        </p:nvSpPr>
-        <p:spPr>
-          <a:xfrm>
-            <a:off x="694906" y="6111261"/>
-            <a:ext cx="1140056" cy="307777"/>
-          </a:xfrm>
-          <a:prstGeom prst="rect">
-            <a:avLst/>
-          </a:prstGeom>
-          <a:noFill/>
-        </p:spPr>
-        <p:txBody>
-          <a:bodyPr wrap="none" rtlCol="0">
-            <a:spAutoFit/>
-          </a:bodyPr>
-          <a:lstStyle/>
-          <a:p>
-            <a:r>
-              <a:rPr lang="en-NL" sz="1400" dirty="0">
-                <a:solidFill>
-                  <a:schemeClr val="bg1">
-                    <a:lumMod val="50000"/>
-                  </a:schemeClr>
-                </a:solidFill>
-              </a:rPr>
-              <a:t>Xoriant.com</a:t>
-            </a:r>
-          </a:p>
-        </p:txBody>
-      </p:sp>
-      <p:sp>
-        <p:nvSpPr>
-          <p:cNvPr id="9" name="TextBox 8">
-            <a:extLst>
-              <a:ext uri="{FF2B5EF4-FFF2-40B4-BE49-F238E27FC236}">
-                <a16:creationId xmlns:a16="http://schemas.microsoft.com/office/drawing/2014/main" id="{6F18B281-9609-E788-CCEC-44DD75998D3B}"/>
-              </a:ext>
-            </a:extLst>
-          </p:cNvPr>
-          <p:cNvSpPr txBox="1"/>
-          <p:nvPr/>
-        </p:nvSpPr>
-        <p:spPr>
-          <a:xfrm>
-            <a:off x="694906" y="3873674"/>
-            <a:ext cx="1531188" cy="369332"/>
-          </a:xfrm>
-          <a:prstGeom prst="rect">
-            <a:avLst/>
-          </a:prstGeom>
-          <a:noFill/>
-        </p:spPr>
-        <p:txBody>
-          <a:bodyPr wrap="none" rtlCol="0">
-            <a:spAutoFit/>
-          </a:bodyPr>
-          <a:lstStyle/>
-          <a:p>
-            <a:r>
-              <a:rPr lang="en-NL" dirty="0"/>
-              <a:t>Decision tree</a:t>
-            </a:r>
-          </a:p>
-        </p:txBody>
-      </p:sp>
-      <p:sp>
-        <p:nvSpPr>
-          <p:cNvPr id="15" name="TextBox 14">
-            <a:extLst>
-              <a:ext uri="{FF2B5EF4-FFF2-40B4-BE49-F238E27FC236}">
-                <a16:creationId xmlns:a16="http://schemas.microsoft.com/office/drawing/2014/main" id="{6975F0F8-6D66-0EB1-64B9-9A7BB4F4C4FA}"/>
-              </a:ext>
-            </a:extLst>
-          </p:cNvPr>
-          <p:cNvSpPr txBox="1"/>
-          <p:nvPr/>
-        </p:nvSpPr>
-        <p:spPr>
-          <a:xfrm>
-            <a:off x="4069512" y="3852998"/>
-            <a:ext cx="3300904" cy="369332"/>
-          </a:xfrm>
-          <a:prstGeom prst="rect">
-            <a:avLst/>
-          </a:prstGeom>
-          <a:noFill/>
-        </p:spPr>
-        <p:txBody>
-          <a:bodyPr wrap="none" rtlCol="0">
-            <a:spAutoFit/>
-          </a:bodyPr>
-          <a:lstStyle/>
-          <a:p>
-            <a:r>
-              <a:rPr lang="en-NL" dirty="0"/>
-              <a:t>Ensemble (e.g. random forest)</a:t>
-            </a:r>
-          </a:p>
-        </p:txBody>
-      </p:sp>
-      <p:sp>
-        <p:nvSpPr>
-          <p:cNvPr id="16" name="TextBox 15">
-            <a:extLst>
-              <a:ext uri="{FF2B5EF4-FFF2-40B4-BE49-F238E27FC236}">
-                <a16:creationId xmlns:a16="http://schemas.microsoft.com/office/drawing/2014/main" id="{1757B441-0FB9-3A37-40EB-0F7A568F1F36}"/>
-              </a:ext>
-            </a:extLst>
-          </p:cNvPr>
-          <p:cNvSpPr txBox="1"/>
-          <p:nvPr/>
-        </p:nvSpPr>
-        <p:spPr>
-          <a:xfrm>
-            <a:off x="7571556" y="3103274"/>
-            <a:ext cx="2031325" cy="369332"/>
-          </a:xfrm>
-          <a:prstGeom prst="rect">
-            <a:avLst/>
-          </a:prstGeom>
-          <a:noFill/>
-        </p:spPr>
-        <p:txBody>
-          <a:bodyPr wrap="none" rtlCol="0">
-            <a:spAutoFit/>
-          </a:bodyPr>
-          <a:lstStyle/>
-          <a:p>
-            <a:r>
-              <a:rPr lang="en-NL" dirty="0"/>
-              <a:t>Gradient Boosting</a:t>
-            </a:r>
-          </a:p>
-        </p:txBody>
-      </p:sp>
+        </p:nvGrpSpPr>
+        <p:grpSpPr>
+          <a:xfrm>
+            <a:off x="762000" y="2520005"/>
+            <a:ext cx="10956130" cy="3899031"/>
+            <a:chOff x="762000" y="2520005"/>
+            <a:chExt cx="10956130" cy="3899031"/>
+          </a:xfrm>
+        </p:grpSpPr>
+        <p:sp>
+          <p:nvSpPr>
+            <p:cNvPr id="3" name="TextBox 2">
+              <a:extLst>
+                <a:ext uri="{FF2B5EF4-FFF2-40B4-BE49-F238E27FC236}">
+                  <a16:creationId xmlns:a16="http://schemas.microsoft.com/office/drawing/2014/main" id="{90AA7683-02D6-81C3-01B5-CBE1CF9301CD}"/>
+                </a:ext>
+              </a:extLst>
+            </p:cNvPr>
+            <p:cNvSpPr txBox="1"/>
+            <p:nvPr/>
+          </p:nvSpPr>
+          <p:spPr>
+            <a:xfrm>
+              <a:off x="7571556" y="6111259"/>
+              <a:ext cx="1407758" cy="307777"/>
+            </a:xfrm>
+            <a:prstGeom prst="rect">
+              <a:avLst/>
+            </a:prstGeom>
+            <a:noFill/>
+          </p:spPr>
+          <p:txBody>
+            <a:bodyPr wrap="none" rtlCol="0">
+              <a:spAutoFit/>
+            </a:bodyPr>
+            <a:lstStyle/>
+            <a:p>
+              <a:r>
+                <a:rPr lang="en-NL" sz="1400" dirty="0">
+                  <a:solidFill>
+                    <a:schemeClr val="bg1">
+                      <a:lumMod val="50000"/>
+                    </a:schemeClr>
+                  </a:solidFill>
+                </a:rPr>
+                <a:t>Guo et al, 2020</a:t>
+              </a:r>
+            </a:p>
+          </p:txBody>
+        </p:sp>
+        <p:sp>
+          <p:nvSpPr>
+            <p:cNvPr id="16" name="TextBox 15">
+              <a:extLst>
+                <a:ext uri="{FF2B5EF4-FFF2-40B4-BE49-F238E27FC236}">
+                  <a16:creationId xmlns:a16="http://schemas.microsoft.com/office/drawing/2014/main" id="{1757B441-0FB9-3A37-40EB-0F7A568F1F36}"/>
+                </a:ext>
+              </a:extLst>
+            </p:cNvPr>
+            <p:cNvSpPr txBox="1"/>
+            <p:nvPr/>
+          </p:nvSpPr>
+          <p:spPr>
+            <a:xfrm>
+              <a:off x="7571556" y="3103274"/>
+              <a:ext cx="2031325" cy="369332"/>
+            </a:xfrm>
+            <a:prstGeom prst="rect">
+              <a:avLst/>
+            </a:prstGeom>
+            <a:noFill/>
+          </p:spPr>
+          <p:txBody>
+            <a:bodyPr wrap="none" rtlCol="0">
+              <a:spAutoFit/>
+            </a:bodyPr>
+            <a:lstStyle/>
+            <a:p>
+              <a:r>
+                <a:rPr lang="en-NL" dirty="0"/>
+                <a:t>Gradient Boosting</a:t>
+              </a:r>
+            </a:p>
+          </p:txBody>
+        </p:sp>
+        <p:grpSp>
+          <p:nvGrpSpPr>
+            <p:cNvPr id="10" name="Group 9">
+              <a:extLst>
+                <a:ext uri="{FF2B5EF4-FFF2-40B4-BE49-F238E27FC236}">
+                  <a16:creationId xmlns:a16="http://schemas.microsoft.com/office/drawing/2014/main" id="{5DE93FCF-2C7E-45A7-4F57-7210DB0BB146}"/>
+                </a:ext>
+              </a:extLst>
+            </p:cNvPr>
+            <p:cNvGrpSpPr/>
+            <p:nvPr/>
+          </p:nvGrpSpPr>
+          <p:grpSpPr>
+            <a:xfrm>
+              <a:off x="762000" y="2520005"/>
+              <a:ext cx="10956130" cy="3591254"/>
+              <a:chOff x="762000" y="2520005"/>
+              <a:chExt cx="10956130" cy="3591254"/>
+            </a:xfrm>
+          </p:grpSpPr>
+          <p:pic>
+            <p:nvPicPr>
+              <p:cNvPr id="15364" name="Picture 4" descr="Flow chart of XGBoost.">
+                <a:extLst>
+                  <a:ext uri="{FF2B5EF4-FFF2-40B4-BE49-F238E27FC236}">
+                    <a16:creationId xmlns:a16="http://schemas.microsoft.com/office/drawing/2014/main" id="{F56CE601-0424-C903-208E-B5681CAA408F}"/>
+                  </a:ext>
+                </a:extLst>
+              </p:cNvPr>
+              <p:cNvPicPr>
+                <a:picLocks noChangeAspect="1" noChangeArrowheads="1"/>
+              </p:cNvPicPr>
+              <p:nvPr/>
+            </p:nvPicPr>
+            <p:blipFill>
+              <a:blip r:embed="rId4">
+                <a:extLst>
+                  <a:ext uri="{28A0092B-C50C-407E-A947-70E740481C1C}">
+                    <a14:useLocalDpi xmlns:a14="http://schemas.microsoft.com/office/drawing/2010/main" val="0"/>
+                  </a:ext>
+                </a:extLst>
+              </a:blip>
+              <a:srcRect/>
+              <a:stretch>
+                <a:fillRect/>
+              </a:stretch>
+            </p:blipFill>
+            <p:spPr bwMode="auto">
+              <a:xfrm>
+                <a:off x="7571556" y="3481843"/>
+                <a:ext cx="4146574" cy="2629416"/>
+              </a:xfrm>
+              <a:prstGeom prst="rect">
+                <a:avLst/>
+              </a:prstGeom>
+              <a:noFill/>
+              <a:extLst>
+                <a:ext uri="{909E8E84-426E-40DD-AFC4-6F175D3DCCD1}">
+                  <a14:hiddenFill xmlns:a14="http://schemas.microsoft.com/office/drawing/2010/main">
+                    <a:solidFill>
+                      <a:srgbClr val="FFFFFF"/>
+                    </a:solidFill>
+                  </a14:hiddenFill>
+                </a:ext>
+              </a:extLst>
+            </p:spPr>
+          </p:pic>
+          <p:sp>
+            <p:nvSpPr>
+              <p:cNvPr id="17" name="TextBox 16">
+                <a:extLst>
+                  <a:ext uri="{FF2B5EF4-FFF2-40B4-BE49-F238E27FC236}">
+                    <a16:creationId xmlns:a16="http://schemas.microsoft.com/office/drawing/2014/main" id="{5C38C147-2D8E-BDD4-E735-DC48512DBADF}"/>
+                  </a:ext>
+                </a:extLst>
+              </p:cNvPr>
+              <p:cNvSpPr txBox="1"/>
+              <p:nvPr/>
+            </p:nvSpPr>
+            <p:spPr>
+              <a:xfrm>
+                <a:off x="762000" y="2520005"/>
+                <a:ext cx="9067800" cy="369332"/>
+              </a:xfrm>
+              <a:prstGeom prst="rect">
+                <a:avLst/>
+              </a:prstGeom>
+              <a:noFill/>
+            </p:spPr>
+            <p:txBody>
+              <a:bodyPr wrap="square">
+                <a:spAutoFit/>
+              </a:bodyPr>
+              <a:lstStyle/>
+              <a:p>
+                <a:r>
+                  <a:rPr lang="en-GB" b="0" dirty="0"/>
+                  <a:t>Boosting: Incrementally build trees to fix observations previously miscategorized</a:t>
+                </a:r>
+                <a:endParaRPr lang="en-NL" b="0" dirty="0"/>
+              </a:p>
+            </p:txBody>
+          </p:sp>
+        </p:grpSp>
+      </p:grpSp>
     </p:spTree>
     <p:extLst>
       <p:ext uri="{BB962C8B-B14F-4D97-AF65-F5344CB8AC3E}">
@@ -7689,6 +9234,171 @@
   <p:clrMapOvr>
     <a:masterClrMapping/>
   </p:clrMapOvr>
+  <p:timing>
+    <p:tnLst>
+      <p:par>
+        <p:cTn id="1" dur="indefinite" restart="never" nodeType="tmRoot">
+          <p:childTnLst>
+            <p:seq concurrent="1" nextAc="seek">
+              <p:cTn id="2" dur="indefinite" nodeType="mainSeq">
+                <p:childTnLst>
+                  <p:par>
+                    <p:cTn id="3" fill="hold">
+                      <p:stCondLst>
+                        <p:cond delay="indefinite"/>
+                      </p:stCondLst>
+                      <p:childTnLst>
+                        <p:par>
+                          <p:cTn id="4" fill="hold">
+                            <p:stCondLst>
+                              <p:cond delay="0"/>
+                            </p:stCondLst>
+                            <p:childTnLst>
+                              <p:par>
+                                <p:cTn id="5" presetID="1" presetClass="entr" presetSubtype="0" fill="hold" nodeType="clickEffect">
+                                  <p:stCondLst>
+                                    <p:cond delay="0"/>
+                                  </p:stCondLst>
+                                  <p:childTnLst>
+                                    <p:set>
+                                      <p:cBhvr>
+                                        <p:cTn id="6" dur="1" fill="hold">
+                                          <p:stCondLst>
+                                            <p:cond delay="0"/>
+                                          </p:stCondLst>
+                                        </p:cTn>
+                                        <p:tgtEl>
+                                          <p:spTgt spid="4"/>
+                                        </p:tgtEl>
+                                        <p:attrNameLst>
+                                          <p:attrName>style.visibility</p:attrName>
+                                        </p:attrNameLst>
+                                      </p:cBhvr>
+                                      <p:to>
+                                        <p:strVal val="visible"/>
+                                      </p:to>
+                                    </p:set>
+                                  </p:childTnLst>
+                                </p:cTn>
+                              </p:par>
+                            </p:childTnLst>
+                          </p:cTn>
+                        </p:par>
+                      </p:childTnLst>
+                    </p:cTn>
+                  </p:par>
+                  <p:par>
+                    <p:cTn id="7" fill="hold">
+                      <p:stCondLst>
+                        <p:cond delay="indefinite"/>
+                      </p:stCondLst>
+                      <p:childTnLst>
+                        <p:par>
+                          <p:cTn id="8" fill="hold">
+                            <p:stCondLst>
+                              <p:cond delay="0"/>
+                            </p:stCondLst>
+                            <p:childTnLst>
+                              <p:par>
+                                <p:cTn id="9" presetID="1" presetClass="entr" presetSubtype="0" fill="hold" nodeType="clickEffect">
+                                  <p:stCondLst>
+                                    <p:cond delay="0"/>
+                                  </p:stCondLst>
+                                  <p:childTnLst>
+                                    <p:set>
+                                      <p:cBhvr>
+                                        <p:cTn id="10" dur="1" fill="hold">
+                                          <p:stCondLst>
+                                            <p:cond delay="0"/>
+                                          </p:stCondLst>
+                                        </p:cTn>
+                                        <p:tgtEl>
+                                          <p:spTgt spid="2"/>
+                                        </p:tgtEl>
+                                        <p:attrNameLst>
+                                          <p:attrName>style.visibility</p:attrName>
+                                        </p:attrNameLst>
+                                      </p:cBhvr>
+                                      <p:to>
+                                        <p:strVal val="visible"/>
+                                      </p:to>
+                                    </p:set>
+                                  </p:childTnLst>
+                                </p:cTn>
+                              </p:par>
+                            </p:childTnLst>
+                          </p:cTn>
+                        </p:par>
+                      </p:childTnLst>
+                    </p:cTn>
+                  </p:par>
+                  <p:par>
+                    <p:cTn id="11" fill="hold">
+                      <p:stCondLst>
+                        <p:cond delay="indefinite"/>
+                      </p:stCondLst>
+                      <p:childTnLst>
+                        <p:par>
+                          <p:cTn id="12" fill="hold">
+                            <p:stCondLst>
+                              <p:cond delay="0"/>
+                            </p:stCondLst>
+                            <p:childTnLst>
+                              <p:par>
+                                <p:cTn id="13" presetID="1" presetClass="entr" presetSubtype="0" fill="hold" nodeType="clickEffect">
+                                  <p:stCondLst>
+                                    <p:cond delay="0"/>
+                                  </p:stCondLst>
+                                  <p:childTnLst>
+                                    <p:set>
+                                      <p:cBhvr>
+                                        <p:cTn id="14" dur="1" fill="hold">
+                                          <p:stCondLst>
+                                            <p:cond delay="0"/>
+                                          </p:stCondLst>
+                                        </p:cTn>
+                                        <p:tgtEl>
+                                          <p:spTgt spid="11"/>
+                                        </p:tgtEl>
+                                        <p:attrNameLst>
+                                          <p:attrName>style.visibility</p:attrName>
+                                        </p:attrNameLst>
+                                      </p:cBhvr>
+                                      <p:to>
+                                        <p:strVal val="visible"/>
+                                      </p:to>
+                                    </p:set>
+                                  </p:childTnLst>
+                                </p:cTn>
+                              </p:par>
+                            </p:childTnLst>
+                          </p:cTn>
+                        </p:par>
+                      </p:childTnLst>
+                    </p:cTn>
+                  </p:par>
+                </p:childTnLst>
+              </p:cTn>
+              <p:prevCondLst>
+                <p:cond evt="onPrev" delay="0">
+                  <p:tgtEl>
+                    <p:sldTgt/>
+                  </p:tgtEl>
+                </p:cond>
+              </p:prevCondLst>
+              <p:nextCondLst>
+                <p:cond evt="onNext" delay="0">
+                  <p:tgtEl>
+                    <p:sldTgt/>
+                  </p:tgtEl>
+                </p:cond>
+              </p:nextCondLst>
+            </p:seq>
+          </p:childTnLst>
+        </p:cTn>
+      </p:par>
+    </p:tnLst>
+  </p:timing>
 </p:sld>
 </file>
 
@@ -7752,7 +9462,7 @@
             </a:r>
             <a:r>
               <a:rPr lang="en-US" altLang="en-US" b="0" dirty="0"/>
-              <a:t> of outcomes with interpretability at the individual level (LIME, SHAP)</a:t>
+              <a:t> of outcomes with interpretability at the individual level (e.g., LIME, SHAP)</a:t>
             </a:r>
           </a:p>
           <a:p>
@@ -7785,7 +9495,7 @@
             </a:pPr>
             <a:r>
               <a:rPr lang="en-US" b="0" dirty="0"/>
-              <a:t>Run the ML model </a:t>
+              <a:t>Run the ML model on the full data </a:t>
             </a:r>
             <a:r>
               <a:rPr lang="en-US" b="0" dirty="0">
@@ -8200,8 +9910,8 @@
         </p:nvSpPr>
         <p:spPr>
           <a:xfrm>
-            <a:off x="6896730" y="1486510"/>
-            <a:ext cx="5142870" cy="1477328"/>
+            <a:off x="6094474" y="1441844"/>
+            <a:ext cx="5729225" cy="1477328"/>
           </a:xfrm>
           <a:prstGeom prst="rect">
             <a:avLst/>
@@ -8236,7 +9946,7 @@
             </a:pPr>
             <a:r>
               <a:rPr lang="en-NL" dirty="0"/>
-              <a:t>The “ML” option: evaluate in an external dataset</a:t>
+              <a:t>The “ML” option: evaluate prediction accuracy in an external dataset</a:t>
             </a:r>
           </a:p>
         </p:txBody>
@@ -9344,6 +11054,15 @@
 </file>
 
 <file path=customXml/item1.xml><?xml version="1.0" encoding="utf-8"?>
+<?mso-contentType ?>
+<FormTemplates xmlns="http://schemas.microsoft.com/sharepoint/v3/contenttype/forms">
+  <Display>DocumentLibraryForm</Display>
+  <Edit>DocumentLibraryForm</Edit>
+  <New>DocumentLibraryForm</New>
+</FormTemplates>
+</file>
+
+<file path=customXml/item2.xml><?xml version="1.0" encoding="utf-8"?>
 <p:properties xmlns:p="http://schemas.microsoft.com/office/2006/metadata/properties" xmlns:xsi="http://www.w3.org/2001/XMLSchema-instance" xmlns:pc="http://schemas.microsoft.com/office/infopath/2007/PartnerControls">
   <documentManagement>
     <Status xmlns="71af3243-3dd4-4a8d-8c0d-dd76da1f02a5">Not started</Status>
@@ -9360,15 +11079,6 @@
     <MediaServiceKeyPoints xmlns="71af3243-3dd4-4a8d-8c0d-dd76da1f02a5" xsi:nil="true"/>
   </documentManagement>
 </p:properties>
-</file>
-
-<file path=customXml/item2.xml><?xml version="1.0" encoding="utf-8"?>
-<?mso-contentType ?>
-<FormTemplates xmlns="http://schemas.microsoft.com/sharepoint/v3/contenttype/forms">
-  <Display>DocumentLibraryForm</Display>
-  <Edit>DocumentLibraryForm</Edit>
-  <New>DocumentLibraryForm</New>
-</FormTemplates>
 </file>
 
 <file path=customXml/item3.xml><?xml version="1.0" encoding="utf-8"?>
@@ -9648,6 +11358,14 @@
 </file>
 
 <file path=customXml/itemProps1.xml><?xml version="1.0" encoding="utf-8"?>
+<ds:datastoreItem xmlns:ds="http://schemas.openxmlformats.org/officeDocument/2006/customXml" ds:itemID="{B8AAEAA2-4CF8-449D-8745-25872C8482C9}">
+  <ds:schemaRefs>
+    <ds:schemaRef ds:uri="http://schemas.microsoft.com/sharepoint/v3/contenttype/forms"/>
+  </ds:schemaRefs>
+</ds:datastoreItem>
+</file>
+
+<file path=customXml/itemProps2.xml><?xml version="1.0" encoding="utf-8"?>
 <ds:datastoreItem xmlns:ds="http://schemas.openxmlformats.org/officeDocument/2006/customXml" ds:itemID="{0595BB57-19EB-4557-B5D2-B6E7784AF408}">
   <ds:schemaRefs>
     <ds:schemaRef ds:uri="http://schemas.microsoft.com/office/2006/metadata/properties"/>
@@ -9655,14 +11373,6 @@
     <ds:schemaRef ds:uri="71af3243-3dd4-4a8d-8c0d-dd76da1f02a5"/>
     <ds:schemaRef ds:uri="http://schemas.microsoft.com/sharepoint/v3"/>
     <ds:schemaRef ds:uri="230e9df3-be65-4c73-a93b-d1236ebd677e"/>
-  </ds:schemaRefs>
-</ds:datastoreItem>
-</file>
-
-<file path=customXml/itemProps2.xml><?xml version="1.0" encoding="utf-8"?>
-<ds:datastoreItem xmlns:ds="http://schemas.openxmlformats.org/officeDocument/2006/customXml" ds:itemID="{B8AAEAA2-4CF8-449D-8745-25872C8482C9}">
-  <ds:schemaRefs>
-    <ds:schemaRef ds:uri="http://schemas.microsoft.com/sharepoint/v3/contenttype/forms"/>
   </ds:schemaRefs>
 </ds:datastoreItem>
 </file>

</xml_diff>